<commit_message>
refactor: split input into digital and analog
</commit_message>
<xml_diff>
--- a/docs_raw/class diagramm.pptx
+++ b/docs_raw/class diagramm.pptx
@@ -104,6 +104,11 @@
       </a:defRPr>
     </a:lvl9pPr>
   </p:defaultTextStyle>
+  <p:extLst>
+    <p:ext uri="{EFAFB233-063F-42B5-8137-9DF3F51BA10A}">
+      <p15:sldGuideLst xmlns:p15="http://schemas.microsoft.com/office/powerpoint/2012/main"/>
+    </p:ext>
+  </p:extLst>
 </p:presentation>
 </file>
 
@@ -3335,7 +3340,7 @@
         </p:nvSpPr>
         <p:spPr>
           <a:xfrm>
-            <a:off x="5013889" y="782935"/>
+            <a:off x="5620439" y="800631"/>
             <a:ext cx="763351" cy="246221"/>
           </a:xfrm>
           <a:prstGeom prst="rect">
@@ -3384,7 +3389,7 @@
         </p:nvSpPr>
         <p:spPr>
           <a:xfrm>
-            <a:off x="2029071" y="1482454"/>
+            <a:off x="1865320" y="1509422"/>
             <a:ext cx="1656223" cy="246221"/>
           </a:xfrm>
           <a:prstGeom prst="rect">
@@ -3452,8 +3457,8 @@
         </p:nvCxnSpPr>
         <p:spPr>
           <a:xfrm rot="5400000">
-            <a:off x="3899725" y="-13386"/>
-            <a:ext cx="453298" cy="2538382"/>
+            <a:off x="4116489" y="-376204"/>
+            <a:ext cx="462570" cy="3308683"/>
           </a:xfrm>
           <a:prstGeom prst="bentConnector3">
             <a:avLst/>
@@ -3488,7 +3493,7 @@
         </p:nvSpPr>
         <p:spPr>
           <a:xfrm>
-            <a:off x="820957" y="2106776"/>
+            <a:off x="1608015" y="2114582"/>
             <a:ext cx="1253869" cy="246221"/>
           </a:xfrm>
           <a:prstGeom prst="rect">
@@ -3508,10 +3513,18 @@
           <a:lstStyle/>
           <a:p>
             <a:r>
-              <a:rPr lang="de-DE" sz="1000" dirty="0" err="1"/>
+              <a:rPr lang="de-DE" sz="1000" dirty="0" err="1">
+                <a:solidFill>
+                  <a:srgbClr val="FF0000"/>
+                </a:solidFill>
+              </a:rPr>
               <a:t>FtSwarmDigitalInput</a:t>
             </a:r>
-            <a:endParaRPr lang="de-DE" sz="1000" dirty="0"/>
+            <a:endParaRPr lang="de-DE" sz="1000" dirty="0">
+              <a:solidFill>
+                <a:srgbClr val="FF0000"/>
+              </a:solidFill>
+            </a:endParaRPr>
           </a:p>
         </p:txBody>
       </p:sp>
@@ -3533,8 +3546,8 @@
         </p:nvCxnSpPr>
         <p:spPr>
           <a:xfrm rot="5400000">
-            <a:off x="1963488" y="1213080"/>
-            <a:ext cx="378101" cy="1409291"/>
+            <a:off x="2284722" y="1705871"/>
+            <a:ext cx="358939" cy="458482"/>
           </a:xfrm>
           <a:prstGeom prst="bentConnector3">
             <a:avLst>
@@ -3571,7 +3584,7 @@
         </p:nvSpPr>
         <p:spPr>
           <a:xfrm>
-            <a:off x="1908780" y="2551892"/>
+            <a:off x="2695838" y="2559698"/>
             <a:ext cx="990977" cy="246221"/>
           </a:xfrm>
           <a:prstGeom prst="rect">
@@ -3616,7 +3629,7 @@
         </p:nvCxnSpPr>
         <p:spPr>
           <a:xfrm rot="16200000" flipH="1">
-            <a:off x="1517333" y="2283556"/>
+            <a:off x="2304391" y="2291362"/>
             <a:ext cx="322006" cy="460888"/>
           </a:xfrm>
           <a:prstGeom prst="bentConnector2">
@@ -3652,7 +3665,7 @@
         </p:nvSpPr>
         <p:spPr>
           <a:xfrm>
-            <a:off x="1908779" y="2873897"/>
+            <a:off x="2695837" y="2881703"/>
             <a:ext cx="1255472" cy="246221"/>
           </a:xfrm>
           <a:prstGeom prst="rect">
@@ -3697,7 +3710,7 @@
         </p:nvCxnSpPr>
         <p:spPr>
           <a:xfrm rot="16200000" flipH="1">
-            <a:off x="1356330" y="2444558"/>
+            <a:off x="2143388" y="2452364"/>
             <a:ext cx="644011" cy="460887"/>
           </a:xfrm>
           <a:prstGeom prst="bentConnector2">
@@ -3733,7 +3746,7 @@
         </p:nvSpPr>
         <p:spPr>
           <a:xfrm>
-            <a:off x="1910756" y="3198355"/>
+            <a:off x="2697814" y="3206161"/>
             <a:ext cx="1260281" cy="246221"/>
           </a:xfrm>
           <a:prstGeom prst="rect">
@@ -3774,7 +3787,7 @@
         </p:nvSpPr>
         <p:spPr>
           <a:xfrm>
-            <a:off x="5707937" y="3907023"/>
+            <a:off x="6314487" y="3924719"/>
             <a:ext cx="1819729" cy="246221"/>
           </a:xfrm>
           <a:prstGeom prst="rect">
@@ -3827,7 +3840,7 @@
         </p:nvCxnSpPr>
         <p:spPr>
           <a:xfrm rot="16200000" flipH="1">
-            <a:off x="1195090" y="2605799"/>
+            <a:off x="1982148" y="2613605"/>
             <a:ext cx="968469" cy="462864"/>
           </a:xfrm>
           <a:prstGeom prst="bentConnector2">
@@ -3867,7 +3880,7 @@
         </p:nvCxnSpPr>
         <p:spPr>
           <a:xfrm rot="16200000" flipH="1">
-            <a:off x="4051262" y="2373459"/>
+            <a:off x="4657812" y="2391155"/>
             <a:ext cx="3000978" cy="312372"/>
           </a:xfrm>
           <a:prstGeom prst="bentConnector2">
@@ -3903,7 +3916,7 @@
         </p:nvSpPr>
         <p:spPr>
           <a:xfrm>
-            <a:off x="2769457" y="2113305"/>
+            <a:off x="3556515" y="2121111"/>
             <a:ext cx="1282723" cy="246221"/>
           </a:xfrm>
           <a:prstGeom prst="rect">
@@ -3923,10 +3936,18 @@
           <a:lstStyle/>
           <a:p>
             <a:r>
-              <a:rPr lang="de-DE" sz="1000" dirty="0" err="1"/>
+              <a:rPr lang="de-DE" sz="1000" dirty="0" err="1">
+                <a:solidFill>
+                  <a:srgbClr val="FF0000"/>
+                </a:solidFill>
+              </a:rPr>
               <a:t>FtSwarmAnalogInput</a:t>
             </a:r>
-            <a:endParaRPr lang="de-DE" sz="1000" dirty="0"/>
+            <a:endParaRPr lang="de-DE" sz="1000" dirty="0">
+              <a:solidFill>
+                <a:srgbClr val="FF0000"/>
+              </a:solidFill>
+            </a:endParaRPr>
           </a:p>
         </p:txBody>
       </p:sp>
@@ -3947,8 +3968,8 @@
         </p:nvCxnSpPr>
         <p:spPr>
           <a:xfrm rot="16200000" flipH="1">
-            <a:off x="2941686" y="1644172"/>
-            <a:ext cx="384630" cy="553636"/>
+            <a:off x="3262920" y="1186154"/>
+            <a:ext cx="365468" cy="1504445"/>
           </a:xfrm>
           <a:prstGeom prst="bentConnector3">
             <a:avLst/>
@@ -3983,7 +4004,7 @@
         </p:nvSpPr>
         <p:spPr>
           <a:xfrm>
-            <a:off x="3670959" y="2558420"/>
+            <a:off x="4458017" y="2566226"/>
             <a:ext cx="1176925" cy="246221"/>
           </a:xfrm>
           <a:prstGeom prst="rect">
@@ -4024,7 +4045,7 @@
         </p:nvSpPr>
         <p:spPr>
           <a:xfrm>
-            <a:off x="3670958" y="2880424"/>
+            <a:off x="4458016" y="2888230"/>
             <a:ext cx="1220206" cy="246221"/>
           </a:xfrm>
           <a:prstGeom prst="rect">
@@ -4065,7 +4086,7 @@
         </p:nvSpPr>
         <p:spPr>
           <a:xfrm>
-            <a:off x="3670958" y="3202428"/>
+            <a:off x="4458016" y="3210234"/>
             <a:ext cx="1374094" cy="246221"/>
           </a:xfrm>
           <a:prstGeom prst="rect">
@@ -4106,7 +4127,7 @@
         </p:nvSpPr>
         <p:spPr>
           <a:xfrm>
-            <a:off x="3670959" y="3524432"/>
+            <a:off x="4458017" y="3532238"/>
             <a:ext cx="848309" cy="246221"/>
           </a:xfrm>
           <a:prstGeom prst="rect">
@@ -4150,7 +4171,7 @@
         </p:nvCxnSpPr>
         <p:spPr>
           <a:xfrm rot="16200000" flipH="1">
-            <a:off x="3379887" y="2390458"/>
+            <a:off x="4166945" y="2398264"/>
             <a:ext cx="322005" cy="260140"/>
           </a:xfrm>
           <a:prstGeom prst="bentConnector2">
@@ -4190,7 +4211,7 @@
         </p:nvCxnSpPr>
         <p:spPr>
           <a:xfrm rot="16200000" flipH="1">
-            <a:off x="3218884" y="2551460"/>
+            <a:off x="4005942" y="2559266"/>
             <a:ext cx="644009" cy="260139"/>
           </a:xfrm>
           <a:prstGeom prst="bentConnector2">
@@ -4230,7 +4251,7 @@
         </p:nvCxnSpPr>
         <p:spPr>
           <a:xfrm rot="16200000" flipH="1">
-            <a:off x="3057882" y="2712462"/>
+            <a:off x="3844940" y="2720268"/>
             <a:ext cx="966013" cy="260139"/>
           </a:xfrm>
           <a:prstGeom prst="bentConnector2">
@@ -4270,7 +4291,7 @@
         </p:nvCxnSpPr>
         <p:spPr>
           <a:xfrm rot="16200000" flipH="1">
-            <a:off x="2896881" y="2873464"/>
+            <a:off x="3683939" y="2881270"/>
             <a:ext cx="1288017" cy="260140"/>
           </a:xfrm>
           <a:prstGeom prst="bentConnector2">
@@ -4306,7 +4327,7 @@
         </p:nvSpPr>
         <p:spPr>
           <a:xfrm>
-            <a:off x="8103559" y="1491727"/>
+            <a:off x="8710109" y="1509423"/>
             <a:ext cx="1659429" cy="246221"/>
           </a:xfrm>
           <a:prstGeom prst="rect">
@@ -4374,7 +4395,7 @@
         </p:nvCxnSpPr>
         <p:spPr>
           <a:xfrm rot="16200000" flipH="1">
-            <a:off x="6933134" y="-508414"/>
+            <a:off x="7539684" y="-490718"/>
             <a:ext cx="462571" cy="3537709"/>
           </a:xfrm>
           <a:prstGeom prst="bentConnector3">
@@ -4410,7 +4431,7 @@
         </p:nvSpPr>
         <p:spPr>
           <a:xfrm>
-            <a:off x="7840176" y="2143357"/>
+            <a:off x="8446726" y="2161053"/>
             <a:ext cx="978153" cy="246221"/>
           </a:xfrm>
           <a:prstGeom prst="rect">
@@ -4451,7 +4472,7 @@
         </p:nvSpPr>
         <p:spPr>
           <a:xfrm>
-            <a:off x="8697125" y="3960719"/>
+            <a:off x="9303675" y="3978415"/>
             <a:ext cx="1356462" cy="246221"/>
           </a:xfrm>
           <a:prstGeom prst="rect">
@@ -4492,7 +4513,7 @@
         </p:nvSpPr>
         <p:spPr>
           <a:xfrm>
-            <a:off x="9598961" y="4357853"/>
+            <a:off x="10205511" y="4375549"/>
             <a:ext cx="1154483" cy="246221"/>
           </a:xfrm>
           <a:prstGeom prst="rect">
@@ -4533,7 +4554,7 @@
         </p:nvSpPr>
         <p:spPr>
           <a:xfrm>
-            <a:off x="9610228" y="4665331"/>
+            <a:off x="10216778" y="4683027"/>
             <a:ext cx="1406154" cy="246221"/>
           </a:xfrm>
           <a:prstGeom prst="rect">
@@ -4577,7 +4598,7 @@
         </p:nvCxnSpPr>
         <p:spPr>
           <a:xfrm rot="5400000">
-            <a:off x="8428560" y="1638642"/>
+            <a:off x="9035110" y="1656338"/>
             <a:ext cx="405409" cy="604021"/>
           </a:xfrm>
           <a:prstGeom prst="bentConnector3">
@@ -4617,7 +4638,7 @@
         </p:nvCxnSpPr>
         <p:spPr>
           <a:xfrm rot="16200000" flipH="1">
-            <a:off x="7666063" y="3052768"/>
+            <a:off x="8272613" y="3070464"/>
             <a:ext cx="1694252" cy="367872"/>
           </a:xfrm>
           <a:prstGeom prst="bentConnector2">
@@ -4656,7 +4677,7 @@
         </p:nvCxnSpPr>
         <p:spPr>
           <a:xfrm rot="16200000" flipH="1">
-            <a:off x="9350146" y="4232149"/>
+            <a:off x="9956696" y="4249845"/>
             <a:ext cx="274024" cy="223605"/>
           </a:xfrm>
           <a:prstGeom prst="bentConnector2">
@@ -4696,7 +4717,7 @@
         </p:nvCxnSpPr>
         <p:spPr>
           <a:xfrm rot="16200000" flipH="1">
-            <a:off x="9202041" y="4380255"/>
+            <a:off x="9808591" y="4397951"/>
             <a:ext cx="581502" cy="234872"/>
           </a:xfrm>
           <a:prstGeom prst="bentConnector2">
@@ -4732,7 +4753,7 @@
         </p:nvSpPr>
         <p:spPr>
           <a:xfrm>
-            <a:off x="8929517" y="2143357"/>
+            <a:off x="9536067" y="2161053"/>
             <a:ext cx="1244251" cy="246221"/>
           </a:xfrm>
           <a:prstGeom prst="rect">
@@ -4784,7 +4805,7 @@
         </p:nvCxnSpPr>
         <p:spPr>
           <a:xfrm rot="16200000" flipH="1">
-            <a:off x="9039754" y="1631467"/>
+            <a:off x="9646304" y="1649163"/>
             <a:ext cx="405409" cy="618369"/>
           </a:xfrm>
           <a:prstGeom prst="bentConnector3">
@@ -4820,7 +4841,7 @@
         </p:nvSpPr>
         <p:spPr>
           <a:xfrm>
-            <a:off x="9630992" y="2595380"/>
+            <a:off x="10237542" y="2613076"/>
             <a:ext cx="931665" cy="246221"/>
           </a:xfrm>
           <a:prstGeom prst="rect">
@@ -4861,7 +4882,7 @@
         </p:nvSpPr>
         <p:spPr>
           <a:xfrm>
-            <a:off x="9630992" y="2909411"/>
+            <a:off x="10237542" y="2927107"/>
             <a:ext cx="930063" cy="246221"/>
           </a:xfrm>
           <a:prstGeom prst="rect">
@@ -4902,7 +4923,7 @@
         </p:nvSpPr>
         <p:spPr>
           <a:xfrm>
-            <a:off x="9630992" y="3233113"/>
+            <a:off x="10237542" y="3250809"/>
             <a:ext cx="1273105" cy="246221"/>
           </a:xfrm>
           <a:prstGeom prst="rect">
@@ -4943,7 +4964,7 @@
         </p:nvSpPr>
         <p:spPr>
           <a:xfrm>
-            <a:off x="9630991" y="3569207"/>
+            <a:off x="10237541" y="3586903"/>
             <a:ext cx="995785" cy="246221"/>
           </a:xfrm>
           <a:prstGeom prst="rect">
@@ -4987,7 +5008,7 @@
         </p:nvCxnSpPr>
         <p:spPr>
           <a:xfrm rot="16200000" flipH="1">
-            <a:off x="9426861" y="2514359"/>
+            <a:off x="10033411" y="2532055"/>
             <a:ext cx="328913" cy="79349"/>
           </a:xfrm>
           <a:prstGeom prst="bentConnector2">
@@ -5027,7 +5048,7 @@
         </p:nvCxnSpPr>
         <p:spPr>
           <a:xfrm rot="16200000" flipH="1">
-            <a:off x="9269845" y="2671375"/>
+            <a:off x="9876395" y="2689071"/>
             <a:ext cx="642944" cy="79349"/>
           </a:xfrm>
           <a:prstGeom prst="bentConnector2">
@@ -5067,7 +5088,7 @@
         </p:nvCxnSpPr>
         <p:spPr>
           <a:xfrm rot="16200000" flipH="1">
-            <a:off x="9107994" y="2833226"/>
+            <a:off x="9714544" y="2850922"/>
             <a:ext cx="966646" cy="79349"/>
           </a:xfrm>
           <a:prstGeom prst="bentConnector2">
@@ -5107,7 +5128,7 @@
         </p:nvCxnSpPr>
         <p:spPr>
           <a:xfrm rot="16200000" flipH="1">
-            <a:off x="8939947" y="3001274"/>
+            <a:off x="9546497" y="3018970"/>
             <a:ext cx="1302740" cy="79348"/>
           </a:xfrm>
           <a:prstGeom prst="bentConnector2">
@@ -5143,7 +5164,7 @@
         </p:nvSpPr>
         <p:spPr>
           <a:xfrm>
-            <a:off x="5712946" y="1482453"/>
+            <a:off x="6319496" y="1500149"/>
             <a:ext cx="1588897" cy="246221"/>
           </a:xfrm>
           <a:prstGeom prst="rect">
@@ -5196,7 +5217,7 @@
         </p:nvCxnSpPr>
         <p:spPr>
           <a:xfrm rot="16200000" flipH="1">
-            <a:off x="5266051" y="1158669"/>
+            <a:off x="5872601" y="1176365"/>
             <a:ext cx="576408" cy="317381"/>
           </a:xfrm>
           <a:prstGeom prst="bentConnector2">
@@ -5232,7 +5253,7 @@
         </p:nvSpPr>
         <p:spPr>
           <a:xfrm>
-            <a:off x="5712946" y="1870159"/>
+            <a:off x="6319496" y="1887855"/>
             <a:ext cx="1688283" cy="246221"/>
           </a:xfrm>
           <a:prstGeom prst="rect">
@@ -5285,7 +5306,7 @@
         </p:nvCxnSpPr>
         <p:spPr>
           <a:xfrm rot="16200000" flipH="1">
-            <a:off x="5072198" y="1352522"/>
+            <a:off x="5678748" y="1370218"/>
             <a:ext cx="964114" cy="317381"/>
           </a:xfrm>
           <a:prstGeom prst="bentConnector2">
@@ -5321,7 +5342,7 @@
         </p:nvSpPr>
         <p:spPr>
           <a:xfrm>
-            <a:off x="5707979" y="2239488"/>
+            <a:off x="6314529" y="2257184"/>
             <a:ext cx="1604927" cy="246221"/>
           </a:xfrm>
           <a:prstGeom prst="rect">
@@ -5373,7 +5394,7 @@
         </p:nvCxnSpPr>
         <p:spPr>
           <a:xfrm rot="16200000" flipH="1">
-            <a:off x="4885051" y="1539670"/>
+            <a:off x="5491601" y="1557366"/>
             <a:ext cx="1333443" cy="312414"/>
           </a:xfrm>
           <a:prstGeom prst="bentConnector2">
@@ -5409,7 +5430,7 @@
         </p:nvSpPr>
         <p:spPr>
           <a:xfrm>
-            <a:off x="5712946" y="2637278"/>
+            <a:off x="6319496" y="2654974"/>
             <a:ext cx="1903085" cy="246221"/>
           </a:xfrm>
           <a:prstGeom prst="rect">
@@ -5458,7 +5479,7 @@
         </p:nvSpPr>
         <p:spPr>
           <a:xfrm>
-            <a:off x="5707979" y="3072673"/>
+            <a:off x="6314529" y="3090369"/>
             <a:ext cx="1435008" cy="246221"/>
           </a:xfrm>
           <a:prstGeom prst="rect">
@@ -5498,7 +5519,7 @@
         </p:nvSpPr>
         <p:spPr>
           <a:xfrm>
-            <a:off x="5707979" y="3508068"/>
+            <a:off x="6314529" y="3525764"/>
             <a:ext cx="1662635" cy="246221"/>
           </a:xfrm>
           <a:prstGeom prst="rect">
@@ -5551,7 +5572,7 @@
         </p:nvCxnSpPr>
         <p:spPr>
           <a:xfrm rot="16200000" flipH="1">
-            <a:off x="4688639" y="1736081"/>
+            <a:off x="5295189" y="1753777"/>
             <a:ext cx="1731233" cy="317381"/>
           </a:xfrm>
           <a:prstGeom prst="bentConnector2">
@@ -5591,7 +5612,7 @@
         </p:nvCxnSpPr>
         <p:spPr>
           <a:xfrm rot="16200000" flipH="1">
-            <a:off x="4468458" y="1956263"/>
+            <a:off x="5075008" y="1973959"/>
             <a:ext cx="2166628" cy="312414"/>
           </a:xfrm>
           <a:prstGeom prst="bentConnector2">
@@ -5630,7 +5651,7 @@
         </p:nvCxnSpPr>
         <p:spPr>
           <a:xfrm rot="16200000" flipH="1">
-            <a:off x="4250761" y="2173960"/>
+            <a:off x="4857311" y="2191656"/>
             <a:ext cx="2602023" cy="312414"/>
           </a:xfrm>
           <a:prstGeom prst="bentConnector2">
@@ -5666,7 +5687,7 @@
         </p:nvSpPr>
         <p:spPr>
           <a:xfrm>
-            <a:off x="1906374" y="3527959"/>
+            <a:off x="2693432" y="3535765"/>
             <a:ext cx="1093569" cy="246221"/>
           </a:xfrm>
           <a:prstGeom prst="rect">
@@ -5802,7 +5823,7 @@
         </p:nvCxnSpPr>
         <p:spPr>
           <a:xfrm rot="16200000" flipH="1">
-            <a:off x="1028097" y="2772792"/>
+            <a:off x="1815155" y="2780598"/>
             <a:ext cx="1298073" cy="458482"/>
           </a:xfrm>
           <a:prstGeom prst="bentConnector2">
@@ -5838,7 +5859,7 @@
         </p:nvSpPr>
         <p:spPr>
           <a:xfrm>
-            <a:off x="5707979" y="4346583"/>
+            <a:off x="6314529" y="4364279"/>
             <a:ext cx="1056700" cy="246221"/>
           </a:xfrm>
           <a:prstGeom prst="rect">
@@ -5891,7 +5912,7 @@
         </p:nvCxnSpPr>
         <p:spPr>
           <a:xfrm rot="16200000" flipH="1">
-            <a:off x="3831503" y="2593218"/>
+            <a:off x="4438053" y="2610914"/>
             <a:ext cx="3440538" cy="312414"/>
           </a:xfrm>
           <a:prstGeom prst="bentConnector2">
@@ -5927,7 +5948,7 @@
         </p:nvSpPr>
         <p:spPr>
           <a:xfrm>
-            <a:off x="1479425" y="4789710"/>
+            <a:off x="318085" y="2110595"/>
             <a:ext cx="1093569" cy="246221"/>
           </a:xfrm>
           <a:prstGeom prst="rect">
@@ -6532,6 +6553,45 @@
           </a:p>
         </p:txBody>
       </p:sp>
+      <p:cxnSp>
+        <p:nvCxnSpPr>
+          <p:cNvPr id="8" name="Verbinder: gewinkelt 7">
+            <a:extLst>
+              <a:ext uri="{FF2B5EF4-FFF2-40B4-BE49-F238E27FC236}">
+                <a16:creationId xmlns:a16="http://schemas.microsoft.com/office/drawing/2014/main" id="{C7EEC9BD-8EBB-7FA0-6390-EE773F899F10}"/>
+              </a:ext>
+            </a:extLst>
+          </p:cNvPr>
+          <p:cNvCxnSpPr>
+            <a:stCxn id="5" idx="2"/>
+            <a:endCxn id="160" idx="0"/>
+          </p:cNvCxnSpPr>
+          <p:nvPr/>
+        </p:nvCxnSpPr>
+        <p:spPr>
+          <a:xfrm rot="5400000">
+            <a:off x="1601675" y="1018838"/>
+            <a:ext cx="354952" cy="1828562"/>
+          </a:xfrm>
+          <a:prstGeom prst="bentConnector3">
+            <a:avLst/>
+          </a:prstGeom>
+        </p:spPr>
+        <p:style>
+          <a:lnRef idx="1">
+            <a:schemeClr val="accent1"/>
+          </a:lnRef>
+          <a:fillRef idx="0">
+            <a:schemeClr val="accent1"/>
+          </a:fillRef>
+          <a:effectRef idx="0">
+            <a:schemeClr val="accent1"/>
+          </a:effectRef>
+          <a:fontRef idx="minor">
+            <a:schemeClr val="tx1"/>
+          </a:fontRef>
+        </p:style>
+      </p:cxnSp>
     </p:spTree>
     <p:extLst>
       <p:ext uri="{BB962C8B-B14F-4D97-AF65-F5344CB8AC3E}">

</xml_diff>

<commit_message>
fix: Actors didn't work correctly fix: Coredump while starting an own program on a non-Kelda refacoring: FtSwarmXMotor -> FtSwarmMotor
</commit_message>
<xml_diff>
--- a/docs_raw/class diagramm.pptx
+++ b/docs_raw/class diagramm.pptx
@@ -6,6 +6,7 @@
   </p:sldMasterIdLst>
   <p:sldIdLst>
     <p:sldId id="256" r:id="rId2"/>
+    <p:sldId id="257" r:id="rId3"/>
   </p:sldIdLst>
   <p:sldSz cx="12192000" cy="6858000"/>
   <p:notesSz cx="6858000" cy="9144000"/>
@@ -259,7 +260,7 @@
           <a:p>
             <a:fld id="{EBE88FA0-6002-4C4B-9120-294BEA23AAB4}" type="datetimeFigureOut">
               <a:rPr lang="de-DE" smtClean="0"/>
-              <a:t>01.11.2023</a:t>
+              <a:t>02.12.2023</a:t>
             </a:fld>
             <a:endParaRPr lang="de-DE"/>
           </a:p>
@@ -457,7 +458,7 @@
           <a:p>
             <a:fld id="{EBE88FA0-6002-4C4B-9120-294BEA23AAB4}" type="datetimeFigureOut">
               <a:rPr lang="de-DE" smtClean="0"/>
-              <a:t>01.11.2023</a:t>
+              <a:t>02.12.2023</a:t>
             </a:fld>
             <a:endParaRPr lang="de-DE"/>
           </a:p>
@@ -665,7 +666,7 @@
           <a:p>
             <a:fld id="{EBE88FA0-6002-4C4B-9120-294BEA23AAB4}" type="datetimeFigureOut">
               <a:rPr lang="de-DE" smtClean="0"/>
-              <a:t>01.11.2023</a:t>
+              <a:t>02.12.2023</a:t>
             </a:fld>
             <a:endParaRPr lang="de-DE"/>
           </a:p>
@@ -863,7 +864,7 @@
           <a:p>
             <a:fld id="{EBE88FA0-6002-4C4B-9120-294BEA23AAB4}" type="datetimeFigureOut">
               <a:rPr lang="de-DE" smtClean="0"/>
-              <a:t>01.11.2023</a:t>
+              <a:t>02.12.2023</a:t>
             </a:fld>
             <a:endParaRPr lang="de-DE"/>
           </a:p>
@@ -1138,7 +1139,7 @@
           <a:p>
             <a:fld id="{EBE88FA0-6002-4C4B-9120-294BEA23AAB4}" type="datetimeFigureOut">
               <a:rPr lang="de-DE" smtClean="0"/>
-              <a:t>01.11.2023</a:t>
+              <a:t>02.12.2023</a:t>
             </a:fld>
             <a:endParaRPr lang="de-DE"/>
           </a:p>
@@ -1403,7 +1404,7 @@
           <a:p>
             <a:fld id="{EBE88FA0-6002-4C4B-9120-294BEA23AAB4}" type="datetimeFigureOut">
               <a:rPr lang="de-DE" smtClean="0"/>
-              <a:t>01.11.2023</a:t>
+              <a:t>02.12.2023</a:t>
             </a:fld>
             <a:endParaRPr lang="de-DE"/>
           </a:p>
@@ -1815,7 +1816,7 @@
           <a:p>
             <a:fld id="{EBE88FA0-6002-4C4B-9120-294BEA23AAB4}" type="datetimeFigureOut">
               <a:rPr lang="de-DE" smtClean="0"/>
-              <a:t>01.11.2023</a:t>
+              <a:t>02.12.2023</a:t>
             </a:fld>
             <a:endParaRPr lang="de-DE"/>
           </a:p>
@@ -1956,7 +1957,7 @@
           <a:p>
             <a:fld id="{EBE88FA0-6002-4C4B-9120-294BEA23AAB4}" type="datetimeFigureOut">
               <a:rPr lang="de-DE" smtClean="0"/>
-              <a:t>01.11.2023</a:t>
+              <a:t>02.12.2023</a:t>
             </a:fld>
             <a:endParaRPr lang="de-DE"/>
           </a:p>
@@ -2069,7 +2070,7 @@
           <a:p>
             <a:fld id="{EBE88FA0-6002-4C4B-9120-294BEA23AAB4}" type="datetimeFigureOut">
               <a:rPr lang="de-DE" smtClean="0"/>
-              <a:t>01.11.2023</a:t>
+              <a:t>02.12.2023</a:t>
             </a:fld>
             <a:endParaRPr lang="de-DE"/>
           </a:p>
@@ -2380,7 +2381,7 @@
           <a:p>
             <a:fld id="{EBE88FA0-6002-4C4B-9120-294BEA23AAB4}" type="datetimeFigureOut">
               <a:rPr lang="de-DE" smtClean="0"/>
-              <a:t>01.11.2023</a:t>
+              <a:t>02.12.2023</a:t>
             </a:fld>
             <a:endParaRPr lang="de-DE"/>
           </a:p>
@@ -2668,7 +2669,7 @@
           <a:p>
             <a:fld id="{EBE88FA0-6002-4C4B-9120-294BEA23AAB4}" type="datetimeFigureOut">
               <a:rPr lang="de-DE" smtClean="0"/>
-              <a:t>01.11.2023</a:t>
+              <a:t>02.12.2023</a:t>
             </a:fld>
             <a:endParaRPr lang="de-DE"/>
           </a:p>
@@ -2909,7 +2910,7 @@
           <a:p>
             <a:fld id="{EBE88FA0-6002-4C4B-9120-294BEA23AAB4}" type="datetimeFigureOut">
               <a:rPr lang="de-DE" smtClean="0"/>
-              <a:t>01.11.2023</a:t>
+              <a:t>02.12.2023</a:t>
             </a:fld>
             <a:endParaRPr lang="de-DE"/>
           </a:p>
@@ -3513,18 +3514,10 @@
           <a:lstStyle/>
           <a:p>
             <a:r>
-              <a:rPr lang="de-DE" sz="1000" dirty="0" err="1">
-                <a:solidFill>
-                  <a:srgbClr val="FF0000"/>
-                </a:solidFill>
-              </a:rPr>
+              <a:rPr lang="de-DE" sz="1000" dirty="0" err="1"/>
               <a:t>FtSwarmDigitalInput</a:t>
             </a:r>
-            <a:endParaRPr lang="de-DE" sz="1000" dirty="0">
-              <a:solidFill>
-                <a:srgbClr val="FF0000"/>
-              </a:solidFill>
-            </a:endParaRPr>
+            <a:endParaRPr lang="de-DE" sz="1000" dirty="0"/>
           </a:p>
         </p:txBody>
       </p:sp>
@@ -3936,18 +3929,10 @@
           <a:lstStyle/>
           <a:p>
             <a:r>
-              <a:rPr lang="de-DE" sz="1000" dirty="0" err="1">
-                <a:solidFill>
-                  <a:srgbClr val="FF0000"/>
-                </a:solidFill>
-              </a:rPr>
+              <a:rPr lang="de-DE" sz="1000" dirty="0" err="1"/>
               <a:t>FtSwarmAnalogInput</a:t>
             </a:r>
-            <a:endParaRPr lang="de-DE" sz="1000" dirty="0">
-              <a:solidFill>
-                <a:srgbClr val="FF0000"/>
-              </a:solidFill>
-            </a:endParaRPr>
+            <a:endParaRPr lang="de-DE" sz="1000" dirty="0"/>
           </a:p>
         </p:txBody>
       </p:sp>
@@ -4773,18 +4758,10 @@
           <a:lstStyle/>
           <a:p>
             <a:r>
-              <a:rPr lang="de-DE" sz="1000" dirty="0" err="1">
-                <a:solidFill>
-                  <a:srgbClr val="FF0000"/>
-                </a:solidFill>
-              </a:rPr>
+              <a:rPr lang="de-DE" sz="1000" dirty="0" err="1"/>
               <a:t>FtSwarmOnOffActor</a:t>
             </a:r>
-            <a:endParaRPr lang="de-DE" sz="1000" dirty="0">
-              <a:solidFill>
-                <a:srgbClr val="FF0000"/>
-              </a:solidFill>
-            </a:endParaRPr>
+            <a:endParaRPr lang="de-DE" sz="1000" dirty="0"/>
           </a:p>
         </p:txBody>
       </p:sp>
@@ -6347,7 +6324,7 @@
         </p:nvSpPr>
         <p:spPr>
           <a:xfrm>
-            <a:off x="9225433" y="5542734"/>
+            <a:off x="3970704" y="5252014"/>
             <a:ext cx="1335622" cy="215444"/>
           </a:xfrm>
           <a:prstGeom prst="rect">
@@ -6444,7 +6421,7 @@
         </p:nvSpPr>
         <p:spPr>
           <a:xfrm>
-            <a:off x="9225433" y="5832146"/>
+            <a:off x="3970704" y="5541426"/>
             <a:ext cx="1258678" cy="215444"/>
           </a:xfrm>
           <a:prstGeom prst="rect">
@@ -6501,7 +6478,7 @@
         </p:nvSpPr>
         <p:spPr>
           <a:xfrm>
-            <a:off x="9225433" y="6121558"/>
+            <a:off x="3970704" y="5830838"/>
             <a:ext cx="1348446" cy="215444"/>
           </a:xfrm>
           <a:prstGeom prst="rect">
@@ -6596,6 +6573,2524 @@
     <p:extLst>
       <p:ext uri="{BB962C8B-B14F-4D97-AF65-F5344CB8AC3E}">
         <p14:creationId xmlns:p14="http://schemas.microsoft.com/office/powerpoint/2010/main" val="952980968"/>
+      </p:ext>
+    </p:extLst>
+  </p:cSld>
+  <p:clrMapOvr>
+    <a:masterClrMapping/>
+  </p:clrMapOvr>
+</p:sld>
+</file>
+
+<file path=ppt/slides/slide2.xml><?xml version="1.0" encoding="utf-8"?>
+<p:sld xmlns:a="http://schemas.openxmlformats.org/drawingml/2006/main" xmlns:r="http://schemas.openxmlformats.org/officeDocument/2006/relationships" xmlns:p="http://schemas.openxmlformats.org/presentationml/2006/main">
+  <p:cSld>
+    <p:spTree>
+      <p:nvGrpSpPr>
+        <p:cNvPr id="1" name=""/>
+        <p:cNvGrpSpPr/>
+        <p:nvPr/>
+      </p:nvGrpSpPr>
+      <p:grpSpPr>
+        <a:xfrm>
+          <a:off x="0" y="0"/>
+          <a:ext cx="0" cy="0"/>
+          <a:chOff x="0" y="0"/>
+          <a:chExt cx="0" cy="0"/>
+        </a:xfrm>
+      </p:grpSpPr>
+      <p:grpSp>
+        <p:nvGrpSpPr>
+          <p:cNvPr id="11" name="Gruppieren 10">
+            <a:extLst>
+              <a:ext uri="{FF2B5EF4-FFF2-40B4-BE49-F238E27FC236}">
+                <a16:creationId xmlns:a16="http://schemas.microsoft.com/office/drawing/2014/main" id="{161CCEC7-28BE-CD68-9029-8B05B4E29802}"/>
+              </a:ext>
+            </a:extLst>
+          </p:cNvPr>
+          <p:cNvGrpSpPr/>
+          <p:nvPr/>
+        </p:nvGrpSpPr>
+        <p:grpSpPr>
+          <a:xfrm>
+            <a:off x="1608015" y="800631"/>
+            <a:ext cx="10014917" cy="5132363"/>
+            <a:chOff x="1608015" y="800631"/>
+            <a:chExt cx="10014917" cy="5132363"/>
+          </a:xfrm>
+        </p:grpSpPr>
+        <p:sp>
+          <p:nvSpPr>
+            <p:cNvPr id="4" name="Textfeld 3">
+              <a:extLst>
+                <a:ext uri="{FF2B5EF4-FFF2-40B4-BE49-F238E27FC236}">
+                  <a16:creationId xmlns:a16="http://schemas.microsoft.com/office/drawing/2014/main" id="{DDE81746-B900-8779-7A4E-726704960C79}"/>
+                </a:ext>
+              </a:extLst>
+            </p:cNvPr>
+            <p:cNvSpPr txBox="1"/>
+            <p:nvPr/>
+          </p:nvSpPr>
+          <p:spPr>
+            <a:xfrm>
+              <a:off x="5620439" y="800631"/>
+              <a:ext cx="763351" cy="246221"/>
+            </a:xfrm>
+            <a:prstGeom prst="rect">
+              <a:avLst/>
+            </a:prstGeom>
+            <a:noFill/>
+            <a:ln>
+              <a:solidFill>
+                <a:schemeClr val="tx1"/>
+              </a:solidFill>
+            </a:ln>
+          </p:spPr>
+          <p:txBody>
+            <a:bodyPr wrap="none" rtlCol="0">
+              <a:spAutoFit/>
+            </a:bodyPr>
+            <a:lstStyle/>
+            <a:p>
+              <a:r>
+                <a:rPr lang="de-DE" sz="1000" dirty="0" err="1">
+                  <a:solidFill>
+                    <a:srgbClr val="FF0000"/>
+                  </a:solidFill>
+                </a:rPr>
+                <a:t>FtSwarmIO</a:t>
+              </a:r>
+              <a:endParaRPr lang="de-DE" sz="1000" dirty="0">
+                <a:solidFill>
+                  <a:srgbClr val="FF0000"/>
+                </a:solidFill>
+              </a:endParaRPr>
+            </a:p>
+          </p:txBody>
+        </p:sp>
+        <p:sp>
+          <p:nvSpPr>
+            <p:cNvPr id="5" name="Textfeld 4">
+              <a:extLst>
+                <a:ext uri="{FF2B5EF4-FFF2-40B4-BE49-F238E27FC236}">
+                  <a16:creationId xmlns:a16="http://schemas.microsoft.com/office/drawing/2014/main" id="{2D996D3D-6733-6A68-6CBD-159ECB8DF7C4}"/>
+                </a:ext>
+              </a:extLst>
+            </p:cNvPr>
+            <p:cNvSpPr txBox="1"/>
+            <p:nvPr/>
+          </p:nvSpPr>
+          <p:spPr>
+            <a:xfrm>
+              <a:off x="1865320" y="1509422"/>
+              <a:ext cx="1656223" cy="246221"/>
+            </a:xfrm>
+            <a:prstGeom prst="rect">
+              <a:avLst/>
+            </a:prstGeom>
+            <a:noFill/>
+            <a:ln>
+              <a:solidFill>
+                <a:schemeClr val="tx1"/>
+              </a:solidFill>
+            </a:ln>
+          </p:spPr>
+          <p:txBody>
+            <a:bodyPr wrap="none" rtlCol="0">
+              <a:spAutoFit/>
+            </a:bodyPr>
+            <a:lstStyle/>
+            <a:p>
+              <a:r>
+                <a:rPr lang="de-DE" sz="1000" dirty="0" err="1">
+                  <a:solidFill>
+                    <a:srgbClr val="FF0000"/>
+                  </a:solidFill>
+                </a:rPr>
+                <a:t>FtSwarmInput</a:t>
+              </a:r>
+              <a:r>
+                <a:rPr lang="de-DE" sz="1000" dirty="0">
+                  <a:solidFill>
+                    <a:srgbClr val="FF0000"/>
+                  </a:solidFill>
+                </a:rPr>
+                <a:t> -&gt; </a:t>
+              </a:r>
+              <a:r>
+                <a:rPr lang="de-DE" sz="1000" dirty="0" err="1">
+                  <a:solidFill>
+                    <a:srgbClr val="FF0000"/>
+                  </a:solidFill>
+                </a:rPr>
+                <a:t>SwOSInput</a:t>
+              </a:r>
+              <a:endParaRPr lang="de-DE" sz="1000" dirty="0">
+                <a:solidFill>
+                  <a:srgbClr val="FF0000"/>
+                </a:solidFill>
+              </a:endParaRPr>
+            </a:p>
+          </p:txBody>
+        </p:sp>
+        <p:cxnSp>
+          <p:nvCxnSpPr>
+            <p:cNvPr id="7" name="Verbinder: gewinkelt 6">
+              <a:extLst>
+                <a:ext uri="{FF2B5EF4-FFF2-40B4-BE49-F238E27FC236}">
+                  <a16:creationId xmlns:a16="http://schemas.microsoft.com/office/drawing/2014/main" id="{9DE2265A-05C3-9044-1BF9-F2B17B2DAB56}"/>
+                </a:ext>
+              </a:extLst>
+            </p:cNvPr>
+            <p:cNvCxnSpPr>
+              <a:stCxn id="4" idx="2"/>
+              <a:endCxn id="5" idx="0"/>
+            </p:cNvCxnSpPr>
+            <p:nvPr/>
+          </p:nvCxnSpPr>
+          <p:spPr>
+            <a:xfrm rot="5400000">
+              <a:off x="4116489" y="-376204"/>
+              <a:ext cx="462570" cy="3308683"/>
+            </a:xfrm>
+            <a:prstGeom prst="bentConnector3">
+              <a:avLst/>
+            </a:prstGeom>
+          </p:spPr>
+          <p:style>
+            <a:lnRef idx="1">
+              <a:schemeClr val="accent1"/>
+            </a:lnRef>
+            <a:fillRef idx="0">
+              <a:schemeClr val="accent1"/>
+            </a:fillRef>
+            <a:effectRef idx="0">
+              <a:schemeClr val="accent1"/>
+            </a:effectRef>
+            <a:fontRef idx="minor">
+              <a:schemeClr val="tx1"/>
+            </a:fontRef>
+          </p:style>
+        </p:cxnSp>
+        <p:sp>
+          <p:nvSpPr>
+            <p:cNvPr id="9" name="Textfeld 8">
+              <a:extLst>
+                <a:ext uri="{FF2B5EF4-FFF2-40B4-BE49-F238E27FC236}">
+                  <a16:creationId xmlns:a16="http://schemas.microsoft.com/office/drawing/2014/main" id="{9D56CC6E-8779-4120-3E92-F93EA6870BF5}"/>
+                </a:ext>
+              </a:extLst>
+            </p:cNvPr>
+            <p:cNvSpPr txBox="1"/>
+            <p:nvPr/>
+          </p:nvSpPr>
+          <p:spPr>
+            <a:xfrm>
+              <a:off x="1608015" y="2114582"/>
+              <a:ext cx="1253869" cy="246221"/>
+            </a:xfrm>
+            <a:prstGeom prst="rect">
+              <a:avLst/>
+            </a:prstGeom>
+            <a:noFill/>
+            <a:ln>
+              <a:solidFill>
+                <a:schemeClr val="tx1"/>
+              </a:solidFill>
+            </a:ln>
+          </p:spPr>
+          <p:txBody>
+            <a:bodyPr wrap="none" rtlCol="0">
+              <a:spAutoFit/>
+            </a:bodyPr>
+            <a:lstStyle/>
+            <a:p>
+              <a:r>
+                <a:rPr lang="de-DE" sz="1000" dirty="0" err="1"/>
+                <a:t>FtSwarmDigitalInput</a:t>
+              </a:r>
+              <a:endParaRPr lang="de-DE" sz="1000" dirty="0"/>
+            </a:p>
+          </p:txBody>
+        </p:sp>
+        <p:cxnSp>
+          <p:nvCxnSpPr>
+            <p:cNvPr id="10" name="Verbinder: gewinkelt 9">
+              <a:extLst>
+                <a:ext uri="{FF2B5EF4-FFF2-40B4-BE49-F238E27FC236}">
+                  <a16:creationId xmlns:a16="http://schemas.microsoft.com/office/drawing/2014/main" id="{6D3B39E2-899B-2F9B-298C-B6273445D8E8}"/>
+                </a:ext>
+              </a:extLst>
+            </p:cNvPr>
+            <p:cNvCxnSpPr>
+              <a:cxnSpLocks/>
+              <a:stCxn id="5" idx="2"/>
+              <a:endCxn id="9" idx="0"/>
+            </p:cNvCxnSpPr>
+            <p:nvPr/>
+          </p:nvCxnSpPr>
+          <p:spPr>
+            <a:xfrm rot="5400000">
+              <a:off x="2284722" y="1705871"/>
+              <a:ext cx="358939" cy="458482"/>
+            </a:xfrm>
+            <a:prstGeom prst="bentConnector3">
+              <a:avLst>
+                <a:gd name="adj1" fmla="val 50000"/>
+              </a:avLst>
+            </a:prstGeom>
+          </p:spPr>
+          <p:style>
+            <a:lnRef idx="1">
+              <a:schemeClr val="accent1"/>
+            </a:lnRef>
+            <a:fillRef idx="0">
+              <a:schemeClr val="accent1"/>
+            </a:fillRef>
+            <a:effectRef idx="0">
+              <a:schemeClr val="accent1"/>
+            </a:effectRef>
+            <a:fontRef idx="minor">
+              <a:schemeClr val="tx1"/>
+            </a:fontRef>
+          </p:style>
+        </p:cxnSp>
+        <p:sp>
+          <p:nvSpPr>
+            <p:cNvPr id="14" name="Textfeld 13">
+              <a:extLst>
+                <a:ext uri="{FF2B5EF4-FFF2-40B4-BE49-F238E27FC236}">
+                  <a16:creationId xmlns:a16="http://schemas.microsoft.com/office/drawing/2014/main" id="{64D1D269-1897-A50C-BAD3-C381570576BF}"/>
+                </a:ext>
+              </a:extLst>
+            </p:cNvPr>
+            <p:cNvSpPr txBox="1"/>
+            <p:nvPr/>
+          </p:nvSpPr>
+          <p:spPr>
+            <a:xfrm>
+              <a:off x="2695838" y="2559698"/>
+              <a:ext cx="990977" cy="246221"/>
+            </a:xfrm>
+            <a:prstGeom prst="rect">
+              <a:avLst/>
+            </a:prstGeom>
+            <a:noFill/>
+            <a:ln>
+              <a:solidFill>
+                <a:schemeClr val="tx1"/>
+              </a:solidFill>
+            </a:ln>
+          </p:spPr>
+          <p:txBody>
+            <a:bodyPr wrap="none" rtlCol="0">
+              <a:spAutoFit/>
+            </a:bodyPr>
+            <a:lstStyle/>
+            <a:p>
+              <a:r>
+                <a:rPr lang="de-DE" sz="1000" dirty="0" err="1"/>
+                <a:t>FtSwarmSwitch</a:t>
+              </a:r>
+              <a:endParaRPr lang="de-DE" sz="1000" dirty="0"/>
+            </a:p>
+          </p:txBody>
+        </p:sp>
+        <p:cxnSp>
+          <p:nvCxnSpPr>
+            <p:cNvPr id="16" name="Verbinder: gewinkelt 15">
+              <a:extLst>
+                <a:ext uri="{FF2B5EF4-FFF2-40B4-BE49-F238E27FC236}">
+                  <a16:creationId xmlns:a16="http://schemas.microsoft.com/office/drawing/2014/main" id="{1F169D3C-34A9-87EA-B79D-39B341819CE2}"/>
+                </a:ext>
+              </a:extLst>
+            </p:cNvPr>
+            <p:cNvCxnSpPr>
+              <a:cxnSpLocks/>
+              <a:stCxn id="9" idx="2"/>
+              <a:endCxn id="14" idx="1"/>
+            </p:cNvCxnSpPr>
+            <p:nvPr/>
+          </p:nvCxnSpPr>
+          <p:spPr>
+            <a:xfrm rot="16200000" flipH="1">
+              <a:off x="2304391" y="2291362"/>
+              <a:ext cx="322006" cy="460888"/>
+            </a:xfrm>
+            <a:prstGeom prst="bentConnector2">
+              <a:avLst/>
+            </a:prstGeom>
+          </p:spPr>
+          <p:style>
+            <a:lnRef idx="1">
+              <a:schemeClr val="accent1"/>
+            </a:lnRef>
+            <a:fillRef idx="0">
+              <a:schemeClr val="accent1"/>
+            </a:fillRef>
+            <a:effectRef idx="0">
+              <a:schemeClr val="accent1"/>
+            </a:effectRef>
+            <a:fontRef idx="minor">
+              <a:schemeClr val="tx1"/>
+            </a:fontRef>
+          </p:style>
+        </p:cxnSp>
+        <p:sp>
+          <p:nvSpPr>
+            <p:cNvPr id="19" name="Textfeld 18">
+              <a:extLst>
+                <a:ext uri="{FF2B5EF4-FFF2-40B4-BE49-F238E27FC236}">
+                  <a16:creationId xmlns:a16="http://schemas.microsoft.com/office/drawing/2014/main" id="{5113B0DE-D2D3-5B66-E13B-F1FCD6C91E4F}"/>
+                </a:ext>
+              </a:extLst>
+            </p:cNvPr>
+            <p:cNvSpPr txBox="1"/>
+            <p:nvPr/>
+          </p:nvSpPr>
+          <p:spPr>
+            <a:xfrm>
+              <a:off x="2695837" y="2881703"/>
+              <a:ext cx="1255472" cy="246221"/>
+            </a:xfrm>
+            <a:prstGeom prst="rect">
+              <a:avLst/>
+            </a:prstGeom>
+            <a:noFill/>
+            <a:ln>
+              <a:solidFill>
+                <a:schemeClr val="tx1"/>
+              </a:solidFill>
+            </a:ln>
+          </p:spPr>
+          <p:txBody>
+            <a:bodyPr wrap="none" rtlCol="0">
+              <a:spAutoFit/>
+            </a:bodyPr>
+            <a:lstStyle/>
+            <a:p>
+              <a:r>
+                <a:rPr lang="de-DE" sz="1000" dirty="0" err="1"/>
+                <a:t>FtSwarmReedSwitch</a:t>
+              </a:r>
+              <a:endParaRPr lang="de-DE" sz="1000" dirty="0"/>
+            </a:p>
+          </p:txBody>
+        </p:sp>
+        <p:cxnSp>
+          <p:nvCxnSpPr>
+            <p:cNvPr id="20" name="Verbinder: gewinkelt 19">
+              <a:extLst>
+                <a:ext uri="{FF2B5EF4-FFF2-40B4-BE49-F238E27FC236}">
+                  <a16:creationId xmlns:a16="http://schemas.microsoft.com/office/drawing/2014/main" id="{41B9B76E-4C23-3357-AD68-6A8D28F4766D}"/>
+                </a:ext>
+              </a:extLst>
+            </p:cNvPr>
+            <p:cNvCxnSpPr>
+              <a:cxnSpLocks/>
+              <a:stCxn id="9" idx="2"/>
+              <a:endCxn id="19" idx="1"/>
+            </p:cNvCxnSpPr>
+            <p:nvPr/>
+          </p:nvCxnSpPr>
+          <p:spPr>
+            <a:xfrm rot="16200000" flipH="1">
+              <a:off x="2143388" y="2452364"/>
+              <a:ext cx="644011" cy="460887"/>
+            </a:xfrm>
+            <a:prstGeom prst="bentConnector2">
+              <a:avLst/>
+            </a:prstGeom>
+          </p:spPr>
+          <p:style>
+            <a:lnRef idx="1">
+              <a:schemeClr val="accent1"/>
+            </a:lnRef>
+            <a:fillRef idx="0">
+              <a:schemeClr val="accent1"/>
+            </a:fillRef>
+            <a:effectRef idx="0">
+              <a:schemeClr val="accent1"/>
+            </a:effectRef>
+            <a:fontRef idx="minor">
+              <a:schemeClr val="tx1"/>
+            </a:fontRef>
+          </p:style>
+        </p:cxnSp>
+        <p:sp>
+          <p:nvSpPr>
+            <p:cNvPr id="23" name="Textfeld 22">
+              <a:extLst>
+                <a:ext uri="{FF2B5EF4-FFF2-40B4-BE49-F238E27FC236}">
+                  <a16:creationId xmlns:a16="http://schemas.microsoft.com/office/drawing/2014/main" id="{F0ED9D0F-B646-D98C-AA74-DAF64D4FCF13}"/>
+                </a:ext>
+              </a:extLst>
+            </p:cNvPr>
+            <p:cNvSpPr txBox="1"/>
+            <p:nvPr/>
+          </p:nvSpPr>
+          <p:spPr>
+            <a:xfrm>
+              <a:off x="2697814" y="3206161"/>
+              <a:ext cx="1260281" cy="246221"/>
+            </a:xfrm>
+            <a:prstGeom prst="rect">
+              <a:avLst/>
+            </a:prstGeom>
+            <a:noFill/>
+            <a:ln>
+              <a:solidFill>
+                <a:schemeClr val="tx1"/>
+              </a:solidFill>
+            </a:ln>
+          </p:spPr>
+          <p:txBody>
+            <a:bodyPr wrap="none" rtlCol="0">
+              <a:spAutoFit/>
+            </a:bodyPr>
+            <a:lstStyle/>
+            <a:p>
+              <a:r>
+                <a:rPr lang="de-DE" sz="1000" dirty="0" err="1"/>
+                <a:t>FtSwarmLightBarrier</a:t>
+              </a:r>
+              <a:endParaRPr lang="de-DE" sz="1000" dirty="0"/>
+            </a:p>
+          </p:txBody>
+        </p:sp>
+        <p:sp>
+          <p:nvSpPr>
+            <p:cNvPr id="24" name="Textfeld 23">
+              <a:extLst>
+                <a:ext uri="{FF2B5EF4-FFF2-40B4-BE49-F238E27FC236}">
+                  <a16:creationId xmlns:a16="http://schemas.microsoft.com/office/drawing/2014/main" id="{242C9D49-96D8-D791-9B59-E72CEB33889E}"/>
+                </a:ext>
+              </a:extLst>
+            </p:cNvPr>
+            <p:cNvSpPr txBox="1"/>
+            <p:nvPr/>
+          </p:nvSpPr>
+          <p:spPr>
+            <a:xfrm>
+              <a:off x="6314487" y="3924719"/>
+              <a:ext cx="1819729" cy="246221"/>
+            </a:xfrm>
+            <a:prstGeom prst="rect">
+              <a:avLst/>
+            </a:prstGeom>
+            <a:noFill/>
+            <a:ln>
+              <a:solidFill>
+                <a:schemeClr val="tx1"/>
+              </a:solidFill>
+            </a:ln>
+          </p:spPr>
+          <p:txBody>
+            <a:bodyPr wrap="none" rtlCol="0">
+              <a:spAutoFit/>
+            </a:bodyPr>
+            <a:lstStyle/>
+            <a:p>
+              <a:r>
+                <a:rPr lang="de-DE" sz="1000" dirty="0" err="1"/>
+                <a:t>FtSwarmButton</a:t>
+              </a:r>
+              <a:r>
+                <a:rPr lang="de-DE" sz="1000" dirty="0"/>
+                <a:t> -&gt; </a:t>
+              </a:r>
+              <a:r>
+                <a:rPr lang="de-DE" sz="1000" dirty="0" err="1"/>
+                <a:t>SwOSButton</a:t>
+              </a:r>
+              <a:endParaRPr lang="de-DE" sz="1000" dirty="0"/>
+            </a:p>
+          </p:txBody>
+        </p:sp>
+        <p:cxnSp>
+          <p:nvCxnSpPr>
+            <p:cNvPr id="25" name="Verbinder: gewinkelt 24">
+              <a:extLst>
+                <a:ext uri="{FF2B5EF4-FFF2-40B4-BE49-F238E27FC236}">
+                  <a16:creationId xmlns:a16="http://schemas.microsoft.com/office/drawing/2014/main" id="{69A7CA39-C528-9414-B6FB-B4F854178B17}"/>
+                </a:ext>
+              </a:extLst>
+            </p:cNvPr>
+            <p:cNvCxnSpPr>
+              <a:cxnSpLocks/>
+              <a:stCxn id="9" idx="2"/>
+              <a:endCxn id="23" idx="1"/>
+            </p:cNvCxnSpPr>
+            <p:nvPr/>
+          </p:nvCxnSpPr>
+          <p:spPr>
+            <a:xfrm rot="16200000" flipH="1">
+              <a:off x="1982148" y="2613605"/>
+              <a:ext cx="968469" cy="462864"/>
+            </a:xfrm>
+            <a:prstGeom prst="bentConnector2">
+              <a:avLst/>
+            </a:prstGeom>
+          </p:spPr>
+          <p:style>
+            <a:lnRef idx="1">
+              <a:schemeClr val="accent1"/>
+            </a:lnRef>
+            <a:fillRef idx="0">
+              <a:schemeClr val="accent1"/>
+            </a:fillRef>
+            <a:effectRef idx="0">
+              <a:schemeClr val="accent1"/>
+            </a:effectRef>
+            <a:fontRef idx="minor">
+              <a:schemeClr val="tx1"/>
+            </a:fontRef>
+          </p:style>
+        </p:cxnSp>
+        <p:cxnSp>
+          <p:nvCxnSpPr>
+            <p:cNvPr id="30" name="Verbinder: gewinkelt 29">
+              <a:extLst>
+                <a:ext uri="{FF2B5EF4-FFF2-40B4-BE49-F238E27FC236}">
+                  <a16:creationId xmlns:a16="http://schemas.microsoft.com/office/drawing/2014/main" id="{E8462AD2-150C-ADC0-9F20-023AC8D5377C}"/>
+                </a:ext>
+              </a:extLst>
+            </p:cNvPr>
+            <p:cNvCxnSpPr>
+              <a:cxnSpLocks/>
+              <a:stCxn id="4" idx="2"/>
+              <a:endCxn id="24" idx="1"/>
+            </p:cNvCxnSpPr>
+            <p:nvPr/>
+          </p:nvCxnSpPr>
+          <p:spPr>
+            <a:xfrm rot="16200000" flipH="1">
+              <a:off x="4657812" y="2391155"/>
+              <a:ext cx="3000978" cy="312372"/>
+            </a:xfrm>
+            <a:prstGeom prst="bentConnector2">
+              <a:avLst/>
+            </a:prstGeom>
+          </p:spPr>
+          <p:style>
+            <a:lnRef idx="1">
+              <a:schemeClr val="accent1"/>
+            </a:lnRef>
+            <a:fillRef idx="0">
+              <a:schemeClr val="accent1"/>
+            </a:fillRef>
+            <a:effectRef idx="0">
+              <a:schemeClr val="accent1"/>
+            </a:effectRef>
+            <a:fontRef idx="minor">
+              <a:schemeClr val="tx1"/>
+            </a:fontRef>
+          </p:style>
+        </p:cxnSp>
+        <p:sp>
+          <p:nvSpPr>
+            <p:cNvPr id="31" name="Textfeld 30">
+              <a:extLst>
+                <a:ext uri="{FF2B5EF4-FFF2-40B4-BE49-F238E27FC236}">
+                  <a16:creationId xmlns:a16="http://schemas.microsoft.com/office/drawing/2014/main" id="{9891E224-AFF2-AC4F-4FC4-73795F61B706}"/>
+                </a:ext>
+              </a:extLst>
+            </p:cNvPr>
+            <p:cNvSpPr txBox="1"/>
+            <p:nvPr/>
+          </p:nvSpPr>
+          <p:spPr>
+            <a:xfrm>
+              <a:off x="3556515" y="2121111"/>
+              <a:ext cx="1282723" cy="246221"/>
+            </a:xfrm>
+            <a:prstGeom prst="rect">
+              <a:avLst/>
+            </a:prstGeom>
+            <a:noFill/>
+            <a:ln>
+              <a:solidFill>
+                <a:schemeClr val="tx1"/>
+              </a:solidFill>
+            </a:ln>
+          </p:spPr>
+          <p:txBody>
+            <a:bodyPr wrap="none" rtlCol="0">
+              <a:spAutoFit/>
+            </a:bodyPr>
+            <a:lstStyle/>
+            <a:p>
+              <a:r>
+                <a:rPr lang="de-DE" sz="1000" dirty="0" err="1"/>
+                <a:t>FtSwarmAnalogInput</a:t>
+              </a:r>
+              <a:endParaRPr lang="de-DE" sz="1000" dirty="0"/>
+            </a:p>
+          </p:txBody>
+        </p:sp>
+        <p:cxnSp>
+          <p:nvCxnSpPr>
+            <p:cNvPr id="33" name="Verbinder: gewinkelt 32">
+              <a:extLst>
+                <a:ext uri="{FF2B5EF4-FFF2-40B4-BE49-F238E27FC236}">
+                  <a16:creationId xmlns:a16="http://schemas.microsoft.com/office/drawing/2014/main" id="{F9F6A278-C15F-44EE-39DA-10D895E91B48}"/>
+                </a:ext>
+              </a:extLst>
+            </p:cNvPr>
+            <p:cNvCxnSpPr>
+              <a:stCxn id="5" idx="2"/>
+              <a:endCxn id="31" idx="0"/>
+            </p:cNvCxnSpPr>
+            <p:nvPr/>
+          </p:nvCxnSpPr>
+          <p:spPr>
+            <a:xfrm rot="16200000" flipH="1">
+              <a:off x="3262920" y="1186154"/>
+              <a:ext cx="365468" cy="1504445"/>
+            </a:xfrm>
+            <a:prstGeom prst="bentConnector3">
+              <a:avLst/>
+            </a:prstGeom>
+          </p:spPr>
+          <p:style>
+            <a:lnRef idx="1">
+              <a:schemeClr val="accent1"/>
+            </a:lnRef>
+            <a:fillRef idx="0">
+              <a:schemeClr val="accent1"/>
+            </a:fillRef>
+            <a:effectRef idx="0">
+              <a:schemeClr val="accent1"/>
+            </a:effectRef>
+            <a:fontRef idx="minor">
+              <a:schemeClr val="tx1"/>
+            </a:fontRef>
+          </p:style>
+        </p:cxnSp>
+        <p:sp>
+          <p:nvSpPr>
+            <p:cNvPr id="34" name="Textfeld 33">
+              <a:extLst>
+                <a:ext uri="{FF2B5EF4-FFF2-40B4-BE49-F238E27FC236}">
+                  <a16:creationId xmlns:a16="http://schemas.microsoft.com/office/drawing/2014/main" id="{AB7B151E-AF38-1C62-FC54-EE3C6874AFF7}"/>
+                </a:ext>
+              </a:extLst>
+            </p:cNvPr>
+            <p:cNvSpPr txBox="1"/>
+            <p:nvPr/>
+          </p:nvSpPr>
+          <p:spPr>
+            <a:xfrm>
+              <a:off x="4458017" y="2566226"/>
+              <a:ext cx="1176925" cy="246221"/>
+            </a:xfrm>
+            <a:prstGeom prst="rect">
+              <a:avLst/>
+            </a:prstGeom>
+            <a:noFill/>
+            <a:ln>
+              <a:solidFill>
+                <a:schemeClr val="tx1"/>
+              </a:solidFill>
+            </a:ln>
+          </p:spPr>
+          <p:txBody>
+            <a:bodyPr wrap="none" rtlCol="0">
+              <a:spAutoFit/>
+            </a:bodyPr>
+            <a:lstStyle/>
+            <a:p>
+              <a:r>
+                <a:rPr lang="de-DE" sz="1000" dirty="0" err="1"/>
+                <a:t>FtSwarmVoltmeter</a:t>
+              </a:r>
+              <a:endParaRPr lang="de-DE" sz="1000" dirty="0"/>
+            </a:p>
+          </p:txBody>
+        </p:sp>
+        <p:sp>
+          <p:nvSpPr>
+            <p:cNvPr id="35" name="Textfeld 34">
+              <a:extLst>
+                <a:ext uri="{FF2B5EF4-FFF2-40B4-BE49-F238E27FC236}">
+                  <a16:creationId xmlns:a16="http://schemas.microsoft.com/office/drawing/2014/main" id="{426483E1-47F2-7AB7-2C8F-A13B143FBBAE}"/>
+                </a:ext>
+              </a:extLst>
+            </p:cNvPr>
+            <p:cNvSpPr txBox="1"/>
+            <p:nvPr/>
+          </p:nvSpPr>
+          <p:spPr>
+            <a:xfrm>
+              <a:off x="4458016" y="2888230"/>
+              <a:ext cx="1220206" cy="246221"/>
+            </a:xfrm>
+            <a:prstGeom prst="rect">
+              <a:avLst/>
+            </a:prstGeom>
+            <a:noFill/>
+            <a:ln>
+              <a:solidFill>
+                <a:schemeClr val="tx1"/>
+              </a:solidFill>
+            </a:ln>
+          </p:spPr>
+          <p:txBody>
+            <a:bodyPr wrap="none" rtlCol="0">
+              <a:spAutoFit/>
+            </a:bodyPr>
+            <a:lstStyle/>
+            <a:p>
+              <a:r>
+                <a:rPr lang="de-DE" sz="1000" dirty="0" err="1"/>
+                <a:t>FtSwarmOhmmeter</a:t>
+              </a:r>
+              <a:endParaRPr lang="de-DE" sz="1000" dirty="0"/>
+            </a:p>
+          </p:txBody>
+        </p:sp>
+        <p:sp>
+          <p:nvSpPr>
+            <p:cNvPr id="36" name="Textfeld 35">
+              <a:extLst>
+                <a:ext uri="{FF2B5EF4-FFF2-40B4-BE49-F238E27FC236}">
+                  <a16:creationId xmlns:a16="http://schemas.microsoft.com/office/drawing/2014/main" id="{2B25388E-A752-8291-625C-E92AA46D31BC}"/>
+                </a:ext>
+              </a:extLst>
+            </p:cNvPr>
+            <p:cNvSpPr txBox="1"/>
+            <p:nvPr/>
+          </p:nvSpPr>
+          <p:spPr>
+            <a:xfrm>
+              <a:off x="4458016" y="3210234"/>
+              <a:ext cx="1374094" cy="246221"/>
+            </a:xfrm>
+            <a:prstGeom prst="rect">
+              <a:avLst/>
+            </a:prstGeom>
+            <a:noFill/>
+            <a:ln>
+              <a:solidFill>
+                <a:schemeClr val="tx1"/>
+              </a:solidFill>
+            </a:ln>
+          </p:spPr>
+          <p:txBody>
+            <a:bodyPr wrap="none" rtlCol="0">
+              <a:spAutoFit/>
+            </a:bodyPr>
+            <a:lstStyle/>
+            <a:p>
+              <a:r>
+                <a:rPr lang="de-DE" sz="1000" dirty="0" err="1"/>
+                <a:t>FtSwarmThermometer</a:t>
+              </a:r>
+              <a:endParaRPr lang="de-DE" sz="1000" dirty="0"/>
+            </a:p>
+          </p:txBody>
+        </p:sp>
+        <p:sp>
+          <p:nvSpPr>
+            <p:cNvPr id="37" name="Textfeld 36">
+              <a:extLst>
+                <a:ext uri="{FF2B5EF4-FFF2-40B4-BE49-F238E27FC236}">
+                  <a16:creationId xmlns:a16="http://schemas.microsoft.com/office/drawing/2014/main" id="{AFD2A88B-6E3B-4CDE-784F-7AF2D21B655E}"/>
+                </a:ext>
+              </a:extLst>
+            </p:cNvPr>
+            <p:cNvSpPr txBox="1"/>
+            <p:nvPr/>
+          </p:nvSpPr>
+          <p:spPr>
+            <a:xfrm>
+              <a:off x="4458017" y="3532238"/>
+              <a:ext cx="848309" cy="246221"/>
+            </a:xfrm>
+            <a:prstGeom prst="rect">
+              <a:avLst/>
+            </a:prstGeom>
+            <a:noFill/>
+            <a:ln>
+              <a:solidFill>
+                <a:schemeClr val="tx1"/>
+              </a:solidFill>
+            </a:ln>
+          </p:spPr>
+          <p:txBody>
+            <a:bodyPr wrap="none" rtlCol="0">
+              <a:spAutoFit/>
+            </a:bodyPr>
+            <a:lstStyle/>
+            <a:p>
+              <a:r>
+                <a:rPr lang="de-DE" sz="1000" dirty="0" err="1"/>
+                <a:t>FtSwarmLDR</a:t>
+              </a:r>
+              <a:endParaRPr lang="de-DE" sz="1000" dirty="0"/>
+            </a:p>
+          </p:txBody>
+        </p:sp>
+        <p:cxnSp>
+          <p:nvCxnSpPr>
+            <p:cNvPr id="39" name="Verbinder: gewinkelt 38">
+              <a:extLst>
+                <a:ext uri="{FF2B5EF4-FFF2-40B4-BE49-F238E27FC236}">
+                  <a16:creationId xmlns:a16="http://schemas.microsoft.com/office/drawing/2014/main" id="{A2002917-3D47-5C7C-82A0-0158191EA2BF}"/>
+                </a:ext>
+              </a:extLst>
+            </p:cNvPr>
+            <p:cNvCxnSpPr>
+              <a:stCxn id="31" idx="2"/>
+              <a:endCxn id="34" idx="1"/>
+            </p:cNvCxnSpPr>
+            <p:nvPr/>
+          </p:nvCxnSpPr>
+          <p:spPr>
+            <a:xfrm rot="16200000" flipH="1">
+              <a:off x="4166945" y="2398264"/>
+              <a:ext cx="322005" cy="260140"/>
+            </a:xfrm>
+            <a:prstGeom prst="bentConnector2">
+              <a:avLst/>
+            </a:prstGeom>
+          </p:spPr>
+          <p:style>
+            <a:lnRef idx="1">
+              <a:schemeClr val="accent1"/>
+            </a:lnRef>
+            <a:fillRef idx="0">
+              <a:schemeClr val="accent1"/>
+            </a:fillRef>
+            <a:effectRef idx="0">
+              <a:schemeClr val="accent1"/>
+            </a:effectRef>
+            <a:fontRef idx="minor">
+              <a:schemeClr val="tx1"/>
+            </a:fontRef>
+          </p:style>
+        </p:cxnSp>
+        <p:cxnSp>
+          <p:nvCxnSpPr>
+            <p:cNvPr id="40" name="Verbinder: gewinkelt 39">
+              <a:extLst>
+                <a:ext uri="{FF2B5EF4-FFF2-40B4-BE49-F238E27FC236}">
+                  <a16:creationId xmlns:a16="http://schemas.microsoft.com/office/drawing/2014/main" id="{7A9971DC-4AB9-AC51-9375-6475F87A41FE}"/>
+                </a:ext>
+              </a:extLst>
+            </p:cNvPr>
+            <p:cNvCxnSpPr>
+              <a:cxnSpLocks/>
+              <a:stCxn id="31" idx="2"/>
+              <a:endCxn id="35" idx="1"/>
+            </p:cNvCxnSpPr>
+            <p:nvPr/>
+          </p:nvCxnSpPr>
+          <p:spPr>
+            <a:xfrm rot="16200000" flipH="1">
+              <a:off x="4005942" y="2559266"/>
+              <a:ext cx="644009" cy="260139"/>
+            </a:xfrm>
+            <a:prstGeom prst="bentConnector2">
+              <a:avLst/>
+            </a:prstGeom>
+          </p:spPr>
+          <p:style>
+            <a:lnRef idx="1">
+              <a:schemeClr val="accent1"/>
+            </a:lnRef>
+            <a:fillRef idx="0">
+              <a:schemeClr val="accent1"/>
+            </a:fillRef>
+            <a:effectRef idx="0">
+              <a:schemeClr val="accent1"/>
+            </a:effectRef>
+            <a:fontRef idx="minor">
+              <a:schemeClr val="tx1"/>
+            </a:fontRef>
+          </p:style>
+        </p:cxnSp>
+        <p:cxnSp>
+          <p:nvCxnSpPr>
+            <p:cNvPr id="43" name="Verbinder: gewinkelt 42">
+              <a:extLst>
+                <a:ext uri="{FF2B5EF4-FFF2-40B4-BE49-F238E27FC236}">
+                  <a16:creationId xmlns:a16="http://schemas.microsoft.com/office/drawing/2014/main" id="{929F9556-3CC7-5BA2-533C-269F799CCB14}"/>
+                </a:ext>
+              </a:extLst>
+            </p:cNvPr>
+            <p:cNvCxnSpPr>
+              <a:cxnSpLocks/>
+              <a:stCxn id="31" idx="2"/>
+              <a:endCxn id="36" idx="1"/>
+            </p:cNvCxnSpPr>
+            <p:nvPr/>
+          </p:nvCxnSpPr>
+          <p:spPr>
+            <a:xfrm rot="16200000" flipH="1">
+              <a:off x="3844940" y="2720268"/>
+              <a:ext cx="966013" cy="260139"/>
+            </a:xfrm>
+            <a:prstGeom prst="bentConnector2">
+              <a:avLst/>
+            </a:prstGeom>
+          </p:spPr>
+          <p:style>
+            <a:lnRef idx="1">
+              <a:schemeClr val="accent1"/>
+            </a:lnRef>
+            <a:fillRef idx="0">
+              <a:schemeClr val="accent1"/>
+            </a:fillRef>
+            <a:effectRef idx="0">
+              <a:schemeClr val="accent1"/>
+            </a:effectRef>
+            <a:fontRef idx="minor">
+              <a:schemeClr val="tx1"/>
+            </a:fontRef>
+          </p:style>
+        </p:cxnSp>
+        <p:cxnSp>
+          <p:nvCxnSpPr>
+            <p:cNvPr id="46" name="Verbinder: gewinkelt 45">
+              <a:extLst>
+                <a:ext uri="{FF2B5EF4-FFF2-40B4-BE49-F238E27FC236}">
+                  <a16:creationId xmlns:a16="http://schemas.microsoft.com/office/drawing/2014/main" id="{EEC3769D-D8E7-3F3A-1FE0-A5AF10A87C7A}"/>
+                </a:ext>
+              </a:extLst>
+            </p:cNvPr>
+            <p:cNvCxnSpPr>
+              <a:cxnSpLocks/>
+              <a:stCxn id="31" idx="2"/>
+              <a:endCxn id="37" idx="1"/>
+            </p:cNvCxnSpPr>
+            <p:nvPr/>
+          </p:nvCxnSpPr>
+          <p:spPr>
+            <a:xfrm rot="16200000" flipH="1">
+              <a:off x="3683939" y="2881270"/>
+              <a:ext cx="1288017" cy="260140"/>
+            </a:xfrm>
+            <a:prstGeom prst="bentConnector2">
+              <a:avLst/>
+            </a:prstGeom>
+          </p:spPr>
+          <p:style>
+            <a:lnRef idx="1">
+              <a:schemeClr val="accent1"/>
+            </a:lnRef>
+            <a:fillRef idx="0">
+              <a:schemeClr val="accent1"/>
+            </a:fillRef>
+            <a:effectRef idx="0">
+              <a:schemeClr val="accent1"/>
+            </a:effectRef>
+            <a:fontRef idx="minor">
+              <a:schemeClr val="tx1"/>
+            </a:fontRef>
+          </p:style>
+        </p:cxnSp>
+        <p:sp>
+          <p:nvSpPr>
+            <p:cNvPr id="49" name="Textfeld 48">
+              <a:extLst>
+                <a:ext uri="{FF2B5EF4-FFF2-40B4-BE49-F238E27FC236}">
+                  <a16:creationId xmlns:a16="http://schemas.microsoft.com/office/drawing/2014/main" id="{03322C4D-89DF-06EF-70A2-8D0BCEEA367C}"/>
+                </a:ext>
+              </a:extLst>
+            </p:cNvPr>
+            <p:cNvSpPr txBox="1"/>
+            <p:nvPr/>
+          </p:nvSpPr>
+          <p:spPr>
+            <a:xfrm>
+              <a:off x="8710109" y="1509423"/>
+              <a:ext cx="1659429" cy="246221"/>
+            </a:xfrm>
+            <a:prstGeom prst="rect">
+              <a:avLst/>
+            </a:prstGeom>
+            <a:noFill/>
+            <a:ln>
+              <a:solidFill>
+                <a:schemeClr val="tx1"/>
+              </a:solidFill>
+            </a:ln>
+          </p:spPr>
+          <p:txBody>
+            <a:bodyPr wrap="none" rtlCol="0">
+              <a:spAutoFit/>
+            </a:bodyPr>
+            <a:lstStyle/>
+            <a:p>
+              <a:r>
+                <a:rPr lang="de-DE" sz="1000" dirty="0" err="1">
+                  <a:solidFill>
+                    <a:srgbClr val="FF0000"/>
+                  </a:solidFill>
+                </a:rPr>
+                <a:t>FtSwarmActor</a:t>
+              </a:r>
+              <a:r>
+                <a:rPr lang="de-DE" sz="1000" dirty="0">
+                  <a:solidFill>
+                    <a:srgbClr val="FF0000"/>
+                  </a:solidFill>
+                </a:rPr>
+                <a:t> -&gt; </a:t>
+              </a:r>
+              <a:r>
+                <a:rPr lang="de-DE" sz="1000" dirty="0" err="1">
+                  <a:solidFill>
+                    <a:srgbClr val="FF0000"/>
+                  </a:solidFill>
+                </a:rPr>
+                <a:t>SwOsActor</a:t>
+              </a:r>
+              <a:endParaRPr lang="de-DE" sz="1000" dirty="0">
+                <a:solidFill>
+                  <a:srgbClr val="FF0000"/>
+                </a:solidFill>
+              </a:endParaRPr>
+            </a:p>
+          </p:txBody>
+        </p:sp>
+        <p:cxnSp>
+          <p:nvCxnSpPr>
+            <p:cNvPr id="51" name="Verbinder: gewinkelt 50">
+              <a:extLst>
+                <a:ext uri="{FF2B5EF4-FFF2-40B4-BE49-F238E27FC236}">
+                  <a16:creationId xmlns:a16="http://schemas.microsoft.com/office/drawing/2014/main" id="{FF35D4F7-BD2D-9637-AE08-246069407CB6}"/>
+                </a:ext>
+              </a:extLst>
+            </p:cNvPr>
+            <p:cNvCxnSpPr>
+              <a:stCxn id="4" idx="2"/>
+              <a:endCxn id="49" idx="0"/>
+            </p:cNvCxnSpPr>
+            <p:nvPr/>
+          </p:nvCxnSpPr>
+          <p:spPr>
+            <a:xfrm rot="16200000" flipH="1">
+              <a:off x="7539684" y="-490718"/>
+              <a:ext cx="462571" cy="3537709"/>
+            </a:xfrm>
+            <a:prstGeom prst="bentConnector3">
+              <a:avLst/>
+            </a:prstGeom>
+          </p:spPr>
+          <p:style>
+            <a:lnRef idx="1">
+              <a:schemeClr val="accent1"/>
+            </a:lnRef>
+            <a:fillRef idx="0">
+              <a:schemeClr val="accent1"/>
+            </a:fillRef>
+            <a:effectRef idx="0">
+              <a:schemeClr val="accent1"/>
+            </a:effectRef>
+            <a:fontRef idx="minor">
+              <a:schemeClr val="tx1"/>
+            </a:fontRef>
+          </p:style>
+        </p:cxnSp>
+        <p:sp>
+          <p:nvSpPr>
+            <p:cNvPr id="56" name="Textfeld 55">
+              <a:extLst>
+                <a:ext uri="{FF2B5EF4-FFF2-40B4-BE49-F238E27FC236}">
+                  <a16:creationId xmlns:a16="http://schemas.microsoft.com/office/drawing/2014/main" id="{DF23FCA6-CCFB-C750-EDDA-7B69E2E687F5}"/>
+                </a:ext>
+              </a:extLst>
+            </p:cNvPr>
+            <p:cNvSpPr txBox="1"/>
+            <p:nvPr/>
+          </p:nvSpPr>
+          <p:spPr>
+            <a:xfrm>
+              <a:off x="8446726" y="2161053"/>
+              <a:ext cx="978153" cy="246221"/>
+            </a:xfrm>
+            <a:prstGeom prst="rect">
+              <a:avLst/>
+            </a:prstGeom>
+            <a:noFill/>
+            <a:ln>
+              <a:solidFill>
+                <a:schemeClr val="tx1"/>
+              </a:solidFill>
+            </a:ln>
+          </p:spPr>
+          <p:txBody>
+            <a:bodyPr wrap="none" rtlCol="0">
+              <a:spAutoFit/>
+            </a:bodyPr>
+            <a:lstStyle/>
+            <a:p>
+              <a:r>
+                <a:rPr lang="de-DE" sz="1000" dirty="0" err="1"/>
+                <a:t>FtSwarmMotor</a:t>
+              </a:r>
+              <a:endParaRPr lang="de-DE" sz="1000" dirty="0"/>
+            </a:p>
+          </p:txBody>
+        </p:sp>
+        <p:sp>
+          <p:nvSpPr>
+            <p:cNvPr id="57" name="Textfeld 56">
+              <a:extLst>
+                <a:ext uri="{FF2B5EF4-FFF2-40B4-BE49-F238E27FC236}">
+                  <a16:creationId xmlns:a16="http://schemas.microsoft.com/office/drawing/2014/main" id="{47C14F97-D8C7-E247-8137-BAEFABC2DA52}"/>
+                </a:ext>
+              </a:extLst>
+            </p:cNvPr>
+            <p:cNvSpPr txBox="1"/>
+            <p:nvPr/>
+          </p:nvSpPr>
+          <p:spPr>
+            <a:xfrm>
+              <a:off x="9303675" y="3978415"/>
+              <a:ext cx="1356462" cy="246221"/>
+            </a:xfrm>
+            <a:prstGeom prst="rect">
+              <a:avLst/>
+            </a:prstGeom>
+            <a:noFill/>
+            <a:ln>
+              <a:solidFill>
+                <a:schemeClr val="tx1"/>
+              </a:solidFill>
+            </a:ln>
+          </p:spPr>
+          <p:txBody>
+            <a:bodyPr wrap="none" rtlCol="0">
+              <a:spAutoFit/>
+            </a:bodyPr>
+            <a:lstStyle/>
+            <a:p>
+              <a:r>
+                <a:rPr lang="de-DE" sz="1000" dirty="0" err="1"/>
+                <a:t>FtSwarmTractorMotor</a:t>
+              </a:r>
+              <a:endParaRPr lang="de-DE" sz="1000" dirty="0"/>
+            </a:p>
+          </p:txBody>
+        </p:sp>
+        <p:sp>
+          <p:nvSpPr>
+            <p:cNvPr id="58" name="Textfeld 57">
+              <a:extLst>
+                <a:ext uri="{FF2B5EF4-FFF2-40B4-BE49-F238E27FC236}">
+                  <a16:creationId xmlns:a16="http://schemas.microsoft.com/office/drawing/2014/main" id="{A9E5773C-7C1F-5713-55C2-7E97465370CA}"/>
+                </a:ext>
+              </a:extLst>
+            </p:cNvPr>
+            <p:cNvSpPr txBox="1"/>
+            <p:nvPr/>
+          </p:nvSpPr>
+          <p:spPr>
+            <a:xfrm>
+              <a:off x="10205511" y="4375549"/>
+              <a:ext cx="1154483" cy="246221"/>
+            </a:xfrm>
+            <a:prstGeom prst="rect">
+              <a:avLst/>
+            </a:prstGeom>
+            <a:noFill/>
+            <a:ln>
+              <a:solidFill>
+                <a:schemeClr val="tx1"/>
+              </a:solidFill>
+            </a:ln>
+          </p:spPr>
+          <p:txBody>
+            <a:bodyPr wrap="none" rtlCol="0">
+              <a:spAutoFit/>
+            </a:bodyPr>
+            <a:lstStyle/>
+            <a:p>
+              <a:r>
+                <a:rPr lang="de-DE" sz="1000" dirty="0" err="1"/>
+                <a:t>FtSwarmXMMotor</a:t>
+              </a:r>
+              <a:endParaRPr lang="de-DE" sz="1000" dirty="0"/>
+            </a:p>
+          </p:txBody>
+        </p:sp>
+        <p:sp>
+          <p:nvSpPr>
+            <p:cNvPr id="59" name="Textfeld 58">
+              <a:extLst>
+                <a:ext uri="{FF2B5EF4-FFF2-40B4-BE49-F238E27FC236}">
+                  <a16:creationId xmlns:a16="http://schemas.microsoft.com/office/drawing/2014/main" id="{D5A47EFA-48E6-1E3E-610B-390E1A536004}"/>
+                </a:ext>
+              </a:extLst>
+            </p:cNvPr>
+            <p:cNvSpPr txBox="1"/>
+            <p:nvPr/>
+          </p:nvSpPr>
+          <p:spPr>
+            <a:xfrm>
+              <a:off x="10216778" y="4683027"/>
+              <a:ext cx="1406154" cy="246221"/>
+            </a:xfrm>
+            <a:prstGeom prst="rect">
+              <a:avLst/>
+            </a:prstGeom>
+            <a:noFill/>
+            <a:ln>
+              <a:solidFill>
+                <a:schemeClr val="tx1"/>
+              </a:solidFill>
+            </a:ln>
+          </p:spPr>
+          <p:txBody>
+            <a:bodyPr wrap="none" rtlCol="0">
+              <a:spAutoFit/>
+            </a:bodyPr>
+            <a:lstStyle/>
+            <a:p>
+              <a:r>
+                <a:rPr lang="de-DE" sz="1000" dirty="0" err="1"/>
+                <a:t>FtSwarmEncoderMotor</a:t>
+              </a:r>
+              <a:endParaRPr lang="de-DE" sz="1000" dirty="0"/>
+            </a:p>
+          </p:txBody>
+        </p:sp>
+        <p:cxnSp>
+          <p:nvCxnSpPr>
+            <p:cNvPr id="61" name="Verbinder: gewinkelt 60">
+              <a:extLst>
+                <a:ext uri="{FF2B5EF4-FFF2-40B4-BE49-F238E27FC236}">
+                  <a16:creationId xmlns:a16="http://schemas.microsoft.com/office/drawing/2014/main" id="{5ED6F7C6-3E5D-13FF-F18A-2D393C912E17}"/>
+                </a:ext>
+              </a:extLst>
+            </p:cNvPr>
+            <p:cNvCxnSpPr>
+              <a:stCxn id="49" idx="2"/>
+              <a:endCxn id="56" idx="0"/>
+            </p:cNvCxnSpPr>
+            <p:nvPr/>
+          </p:nvCxnSpPr>
+          <p:spPr>
+            <a:xfrm rot="5400000">
+              <a:off x="9035110" y="1656338"/>
+              <a:ext cx="405409" cy="604021"/>
+            </a:xfrm>
+            <a:prstGeom prst="bentConnector3">
+              <a:avLst/>
+            </a:prstGeom>
+          </p:spPr>
+          <p:style>
+            <a:lnRef idx="1">
+              <a:schemeClr val="accent1"/>
+            </a:lnRef>
+            <a:fillRef idx="0">
+              <a:schemeClr val="accent1"/>
+            </a:fillRef>
+            <a:effectRef idx="0">
+              <a:schemeClr val="accent1"/>
+            </a:effectRef>
+            <a:fontRef idx="minor">
+              <a:schemeClr val="tx1"/>
+            </a:fontRef>
+          </p:style>
+        </p:cxnSp>
+        <p:cxnSp>
+          <p:nvCxnSpPr>
+            <p:cNvPr id="63" name="Verbinder: gewinkelt 62">
+              <a:extLst>
+                <a:ext uri="{FF2B5EF4-FFF2-40B4-BE49-F238E27FC236}">
+                  <a16:creationId xmlns:a16="http://schemas.microsoft.com/office/drawing/2014/main" id="{9AB025E7-55A7-3FA6-C785-C7D46E0FF4D3}"/>
+                </a:ext>
+              </a:extLst>
+            </p:cNvPr>
+            <p:cNvCxnSpPr>
+              <a:cxnSpLocks/>
+              <a:stCxn id="56" idx="2"/>
+              <a:endCxn id="57" idx="1"/>
+            </p:cNvCxnSpPr>
+            <p:nvPr/>
+          </p:nvCxnSpPr>
+          <p:spPr>
+            <a:xfrm rot="16200000" flipH="1">
+              <a:off x="8272613" y="3070464"/>
+              <a:ext cx="1694252" cy="367872"/>
+            </a:xfrm>
+            <a:prstGeom prst="bentConnector2">
+              <a:avLst/>
+            </a:prstGeom>
+          </p:spPr>
+          <p:style>
+            <a:lnRef idx="1">
+              <a:schemeClr val="accent1"/>
+            </a:lnRef>
+            <a:fillRef idx="0">
+              <a:schemeClr val="accent1"/>
+            </a:fillRef>
+            <a:effectRef idx="0">
+              <a:schemeClr val="accent1"/>
+            </a:effectRef>
+            <a:fontRef idx="minor">
+              <a:schemeClr val="tx1"/>
+            </a:fontRef>
+          </p:style>
+        </p:cxnSp>
+        <p:cxnSp>
+          <p:nvCxnSpPr>
+            <p:cNvPr id="65" name="Verbinder: gewinkelt 64">
+              <a:extLst>
+                <a:ext uri="{FF2B5EF4-FFF2-40B4-BE49-F238E27FC236}">
+                  <a16:creationId xmlns:a16="http://schemas.microsoft.com/office/drawing/2014/main" id="{86F27AF5-DCC2-F12E-CD5E-462C6186455E}"/>
+                </a:ext>
+              </a:extLst>
+            </p:cNvPr>
+            <p:cNvCxnSpPr>
+              <a:stCxn id="57" idx="2"/>
+              <a:endCxn id="58" idx="1"/>
+            </p:cNvCxnSpPr>
+            <p:nvPr/>
+          </p:nvCxnSpPr>
+          <p:spPr>
+            <a:xfrm rot="16200000" flipH="1">
+              <a:off x="9956696" y="4249845"/>
+              <a:ext cx="274024" cy="223605"/>
+            </a:xfrm>
+            <a:prstGeom prst="bentConnector2">
+              <a:avLst/>
+            </a:prstGeom>
+          </p:spPr>
+          <p:style>
+            <a:lnRef idx="1">
+              <a:schemeClr val="accent1"/>
+            </a:lnRef>
+            <a:fillRef idx="0">
+              <a:schemeClr val="accent1"/>
+            </a:fillRef>
+            <a:effectRef idx="0">
+              <a:schemeClr val="accent1"/>
+            </a:effectRef>
+            <a:fontRef idx="minor">
+              <a:schemeClr val="tx1"/>
+            </a:fontRef>
+          </p:style>
+        </p:cxnSp>
+        <p:cxnSp>
+          <p:nvCxnSpPr>
+            <p:cNvPr id="68" name="Verbinder: gewinkelt 67">
+              <a:extLst>
+                <a:ext uri="{FF2B5EF4-FFF2-40B4-BE49-F238E27FC236}">
+                  <a16:creationId xmlns:a16="http://schemas.microsoft.com/office/drawing/2014/main" id="{D2692564-5409-1BD3-CDC8-2CC53C10EA95}"/>
+                </a:ext>
+              </a:extLst>
+            </p:cNvPr>
+            <p:cNvCxnSpPr>
+              <a:cxnSpLocks/>
+              <a:stCxn id="57" idx="2"/>
+              <a:endCxn id="59" idx="1"/>
+            </p:cNvCxnSpPr>
+            <p:nvPr/>
+          </p:nvCxnSpPr>
+          <p:spPr>
+            <a:xfrm rot="16200000" flipH="1">
+              <a:off x="9808591" y="4397951"/>
+              <a:ext cx="581502" cy="234872"/>
+            </a:xfrm>
+            <a:prstGeom prst="bentConnector2">
+              <a:avLst/>
+            </a:prstGeom>
+          </p:spPr>
+          <p:style>
+            <a:lnRef idx="1">
+              <a:schemeClr val="accent1"/>
+            </a:lnRef>
+            <a:fillRef idx="0">
+              <a:schemeClr val="accent1"/>
+            </a:fillRef>
+            <a:effectRef idx="0">
+              <a:schemeClr val="accent1"/>
+            </a:effectRef>
+            <a:fontRef idx="minor">
+              <a:schemeClr val="tx1"/>
+            </a:fontRef>
+          </p:style>
+        </p:cxnSp>
+        <p:sp>
+          <p:nvSpPr>
+            <p:cNvPr id="71" name="Textfeld 70">
+              <a:extLst>
+                <a:ext uri="{FF2B5EF4-FFF2-40B4-BE49-F238E27FC236}">
+                  <a16:creationId xmlns:a16="http://schemas.microsoft.com/office/drawing/2014/main" id="{46E7D42D-38DF-6CA5-B9DE-C8AD7D74611C}"/>
+                </a:ext>
+              </a:extLst>
+            </p:cNvPr>
+            <p:cNvSpPr txBox="1"/>
+            <p:nvPr/>
+          </p:nvSpPr>
+          <p:spPr>
+            <a:xfrm>
+              <a:off x="9536067" y="2161053"/>
+              <a:ext cx="1244251" cy="246221"/>
+            </a:xfrm>
+            <a:prstGeom prst="rect">
+              <a:avLst/>
+            </a:prstGeom>
+            <a:noFill/>
+            <a:ln>
+              <a:solidFill>
+                <a:schemeClr val="tx1"/>
+              </a:solidFill>
+            </a:ln>
+          </p:spPr>
+          <p:txBody>
+            <a:bodyPr wrap="none" rtlCol="0">
+              <a:spAutoFit/>
+            </a:bodyPr>
+            <a:lstStyle/>
+            <a:p>
+              <a:r>
+                <a:rPr lang="de-DE" sz="1000" dirty="0" err="1"/>
+                <a:t>FtSwarmOnOffActor</a:t>
+              </a:r>
+              <a:endParaRPr lang="de-DE" sz="1000" dirty="0"/>
+            </a:p>
+          </p:txBody>
+        </p:sp>
+        <p:cxnSp>
+          <p:nvCxnSpPr>
+            <p:cNvPr id="73" name="Verbinder: gewinkelt 72">
+              <a:extLst>
+                <a:ext uri="{FF2B5EF4-FFF2-40B4-BE49-F238E27FC236}">
+                  <a16:creationId xmlns:a16="http://schemas.microsoft.com/office/drawing/2014/main" id="{44ABC6B8-064A-3DDD-11D0-57E14A02958F}"/>
+                </a:ext>
+              </a:extLst>
+            </p:cNvPr>
+            <p:cNvCxnSpPr>
+              <a:stCxn id="49" idx="2"/>
+              <a:endCxn id="71" idx="0"/>
+            </p:cNvCxnSpPr>
+            <p:nvPr/>
+          </p:nvCxnSpPr>
+          <p:spPr>
+            <a:xfrm rot="16200000" flipH="1">
+              <a:off x="9646304" y="1649163"/>
+              <a:ext cx="405409" cy="618369"/>
+            </a:xfrm>
+            <a:prstGeom prst="bentConnector3">
+              <a:avLst/>
+            </a:prstGeom>
+          </p:spPr>
+          <p:style>
+            <a:lnRef idx="1">
+              <a:schemeClr val="accent1"/>
+            </a:lnRef>
+            <a:fillRef idx="0">
+              <a:schemeClr val="accent1"/>
+            </a:fillRef>
+            <a:effectRef idx="0">
+              <a:schemeClr val="accent1"/>
+            </a:effectRef>
+            <a:fontRef idx="minor">
+              <a:schemeClr val="tx1"/>
+            </a:fontRef>
+          </p:style>
+        </p:cxnSp>
+        <p:sp>
+          <p:nvSpPr>
+            <p:cNvPr id="74" name="Textfeld 73">
+              <a:extLst>
+                <a:ext uri="{FF2B5EF4-FFF2-40B4-BE49-F238E27FC236}">
+                  <a16:creationId xmlns:a16="http://schemas.microsoft.com/office/drawing/2014/main" id="{17CEF991-9DBD-7225-742C-90EB24B5C33D}"/>
+                </a:ext>
+              </a:extLst>
+            </p:cNvPr>
+            <p:cNvSpPr txBox="1"/>
+            <p:nvPr/>
+          </p:nvSpPr>
+          <p:spPr>
+            <a:xfrm>
+              <a:off x="10237542" y="2613076"/>
+              <a:ext cx="931665" cy="246221"/>
+            </a:xfrm>
+            <a:prstGeom prst="rect">
+              <a:avLst/>
+            </a:prstGeom>
+            <a:noFill/>
+            <a:ln>
+              <a:solidFill>
+                <a:schemeClr val="tx1"/>
+              </a:solidFill>
+            </a:ln>
+          </p:spPr>
+          <p:txBody>
+            <a:bodyPr wrap="none" rtlCol="0">
+              <a:spAutoFit/>
+            </a:bodyPr>
+            <a:lstStyle/>
+            <a:p>
+              <a:r>
+                <a:rPr lang="de-DE" sz="1000" dirty="0" err="1"/>
+                <a:t>FtSwarmLamp</a:t>
+              </a:r>
+              <a:endParaRPr lang="de-DE" sz="1000" dirty="0"/>
+            </a:p>
+          </p:txBody>
+        </p:sp>
+        <p:sp>
+          <p:nvSpPr>
+            <p:cNvPr id="75" name="Textfeld 74">
+              <a:extLst>
+                <a:ext uri="{FF2B5EF4-FFF2-40B4-BE49-F238E27FC236}">
+                  <a16:creationId xmlns:a16="http://schemas.microsoft.com/office/drawing/2014/main" id="{6C0DCA69-5B8B-EA1E-257F-ED79F5FD1377}"/>
+                </a:ext>
+              </a:extLst>
+            </p:cNvPr>
+            <p:cNvSpPr txBox="1"/>
+            <p:nvPr/>
+          </p:nvSpPr>
+          <p:spPr>
+            <a:xfrm>
+              <a:off x="10237542" y="2927107"/>
+              <a:ext cx="930063" cy="246221"/>
+            </a:xfrm>
+            <a:prstGeom prst="rect">
+              <a:avLst/>
+            </a:prstGeom>
+            <a:noFill/>
+            <a:ln>
+              <a:solidFill>
+                <a:schemeClr val="tx1"/>
+              </a:solidFill>
+            </a:ln>
+          </p:spPr>
+          <p:txBody>
+            <a:bodyPr wrap="none" rtlCol="0">
+              <a:spAutoFit/>
+            </a:bodyPr>
+            <a:lstStyle/>
+            <a:p>
+              <a:r>
+                <a:rPr lang="de-DE" sz="1000" dirty="0" err="1"/>
+                <a:t>FtSwarmValve</a:t>
+              </a:r>
+              <a:endParaRPr lang="de-DE" sz="1000" dirty="0"/>
+            </a:p>
+          </p:txBody>
+        </p:sp>
+        <p:sp>
+          <p:nvSpPr>
+            <p:cNvPr id="76" name="Textfeld 75">
+              <a:extLst>
+                <a:ext uri="{FF2B5EF4-FFF2-40B4-BE49-F238E27FC236}">
+                  <a16:creationId xmlns:a16="http://schemas.microsoft.com/office/drawing/2014/main" id="{D3676506-4C00-3BDE-4BD9-55FC2E7A9692}"/>
+                </a:ext>
+              </a:extLst>
+            </p:cNvPr>
+            <p:cNvSpPr txBox="1"/>
+            <p:nvPr/>
+          </p:nvSpPr>
+          <p:spPr>
+            <a:xfrm>
+              <a:off x="10237542" y="3250809"/>
+              <a:ext cx="1273105" cy="246221"/>
+            </a:xfrm>
+            <a:prstGeom prst="rect">
+              <a:avLst/>
+            </a:prstGeom>
+            <a:noFill/>
+            <a:ln>
+              <a:solidFill>
+                <a:schemeClr val="tx1"/>
+              </a:solidFill>
+            </a:ln>
+          </p:spPr>
+          <p:txBody>
+            <a:bodyPr wrap="none" rtlCol="0">
+              <a:spAutoFit/>
+            </a:bodyPr>
+            <a:lstStyle/>
+            <a:p>
+              <a:r>
+                <a:rPr lang="de-DE" sz="1000" dirty="0" err="1"/>
+                <a:t>FtSwarmCompressor</a:t>
+              </a:r>
+              <a:endParaRPr lang="de-DE" sz="1000" dirty="0"/>
+            </a:p>
+          </p:txBody>
+        </p:sp>
+        <p:sp>
+          <p:nvSpPr>
+            <p:cNvPr id="77" name="Textfeld 76">
+              <a:extLst>
+                <a:ext uri="{FF2B5EF4-FFF2-40B4-BE49-F238E27FC236}">
+                  <a16:creationId xmlns:a16="http://schemas.microsoft.com/office/drawing/2014/main" id="{F9BC8B88-F4B2-729C-DB6D-723631D09CC5}"/>
+                </a:ext>
+              </a:extLst>
+            </p:cNvPr>
+            <p:cNvSpPr txBox="1"/>
+            <p:nvPr/>
+          </p:nvSpPr>
+          <p:spPr>
+            <a:xfrm>
+              <a:off x="10237541" y="3586903"/>
+              <a:ext cx="995785" cy="246221"/>
+            </a:xfrm>
+            <a:prstGeom prst="rect">
+              <a:avLst/>
+            </a:prstGeom>
+            <a:noFill/>
+            <a:ln>
+              <a:solidFill>
+                <a:schemeClr val="tx1"/>
+              </a:solidFill>
+            </a:ln>
+          </p:spPr>
+          <p:txBody>
+            <a:bodyPr wrap="none" rtlCol="0">
+              <a:spAutoFit/>
+            </a:bodyPr>
+            <a:lstStyle/>
+            <a:p>
+              <a:r>
+                <a:rPr lang="de-DE" sz="1000" dirty="0" err="1"/>
+                <a:t>FtSwarmBuzzer</a:t>
+              </a:r>
+              <a:endParaRPr lang="de-DE" sz="1000" dirty="0"/>
+            </a:p>
+          </p:txBody>
+        </p:sp>
+        <p:cxnSp>
+          <p:nvCxnSpPr>
+            <p:cNvPr id="79" name="Verbinder: gewinkelt 78">
+              <a:extLst>
+                <a:ext uri="{FF2B5EF4-FFF2-40B4-BE49-F238E27FC236}">
+                  <a16:creationId xmlns:a16="http://schemas.microsoft.com/office/drawing/2014/main" id="{B02DECBC-2D5A-B7AE-761B-E04F38BBCFCD}"/>
+                </a:ext>
+              </a:extLst>
+            </p:cNvPr>
+            <p:cNvCxnSpPr>
+              <a:stCxn id="71" idx="2"/>
+              <a:endCxn id="74" idx="1"/>
+            </p:cNvCxnSpPr>
+            <p:nvPr/>
+          </p:nvCxnSpPr>
+          <p:spPr>
+            <a:xfrm rot="16200000" flipH="1">
+              <a:off x="10033411" y="2532055"/>
+              <a:ext cx="328913" cy="79349"/>
+            </a:xfrm>
+            <a:prstGeom prst="bentConnector2">
+              <a:avLst/>
+            </a:prstGeom>
+          </p:spPr>
+          <p:style>
+            <a:lnRef idx="1">
+              <a:schemeClr val="accent1"/>
+            </a:lnRef>
+            <a:fillRef idx="0">
+              <a:schemeClr val="accent1"/>
+            </a:fillRef>
+            <a:effectRef idx="0">
+              <a:schemeClr val="accent1"/>
+            </a:effectRef>
+            <a:fontRef idx="minor">
+              <a:schemeClr val="tx1"/>
+            </a:fontRef>
+          </p:style>
+        </p:cxnSp>
+        <p:cxnSp>
+          <p:nvCxnSpPr>
+            <p:cNvPr id="80" name="Verbinder: gewinkelt 79">
+              <a:extLst>
+                <a:ext uri="{FF2B5EF4-FFF2-40B4-BE49-F238E27FC236}">
+                  <a16:creationId xmlns:a16="http://schemas.microsoft.com/office/drawing/2014/main" id="{62A02CD0-CEA7-7759-C57D-6D4CABB1D955}"/>
+                </a:ext>
+              </a:extLst>
+            </p:cNvPr>
+            <p:cNvCxnSpPr>
+              <a:cxnSpLocks/>
+              <a:stCxn id="71" idx="2"/>
+              <a:endCxn id="75" idx="1"/>
+            </p:cNvCxnSpPr>
+            <p:nvPr/>
+          </p:nvCxnSpPr>
+          <p:spPr>
+            <a:xfrm rot="16200000" flipH="1">
+              <a:off x="9876395" y="2689071"/>
+              <a:ext cx="642944" cy="79349"/>
+            </a:xfrm>
+            <a:prstGeom prst="bentConnector2">
+              <a:avLst/>
+            </a:prstGeom>
+          </p:spPr>
+          <p:style>
+            <a:lnRef idx="1">
+              <a:schemeClr val="accent1"/>
+            </a:lnRef>
+            <a:fillRef idx="0">
+              <a:schemeClr val="accent1"/>
+            </a:fillRef>
+            <a:effectRef idx="0">
+              <a:schemeClr val="accent1"/>
+            </a:effectRef>
+            <a:fontRef idx="minor">
+              <a:schemeClr val="tx1"/>
+            </a:fontRef>
+          </p:style>
+        </p:cxnSp>
+        <p:cxnSp>
+          <p:nvCxnSpPr>
+            <p:cNvPr id="83" name="Verbinder: gewinkelt 82">
+              <a:extLst>
+                <a:ext uri="{FF2B5EF4-FFF2-40B4-BE49-F238E27FC236}">
+                  <a16:creationId xmlns:a16="http://schemas.microsoft.com/office/drawing/2014/main" id="{13822D21-9624-9BB4-CB9C-76B06ED0B0BB}"/>
+                </a:ext>
+              </a:extLst>
+            </p:cNvPr>
+            <p:cNvCxnSpPr>
+              <a:cxnSpLocks/>
+              <a:stCxn id="71" idx="2"/>
+              <a:endCxn id="76" idx="1"/>
+            </p:cNvCxnSpPr>
+            <p:nvPr/>
+          </p:nvCxnSpPr>
+          <p:spPr>
+            <a:xfrm rot="16200000" flipH="1">
+              <a:off x="9714544" y="2850922"/>
+              <a:ext cx="966646" cy="79349"/>
+            </a:xfrm>
+            <a:prstGeom prst="bentConnector2">
+              <a:avLst/>
+            </a:prstGeom>
+          </p:spPr>
+          <p:style>
+            <a:lnRef idx="1">
+              <a:schemeClr val="accent1"/>
+            </a:lnRef>
+            <a:fillRef idx="0">
+              <a:schemeClr val="accent1"/>
+            </a:fillRef>
+            <a:effectRef idx="0">
+              <a:schemeClr val="accent1"/>
+            </a:effectRef>
+            <a:fontRef idx="minor">
+              <a:schemeClr val="tx1"/>
+            </a:fontRef>
+          </p:style>
+        </p:cxnSp>
+        <p:cxnSp>
+          <p:nvCxnSpPr>
+            <p:cNvPr id="86" name="Verbinder: gewinkelt 85">
+              <a:extLst>
+                <a:ext uri="{FF2B5EF4-FFF2-40B4-BE49-F238E27FC236}">
+                  <a16:creationId xmlns:a16="http://schemas.microsoft.com/office/drawing/2014/main" id="{3C825C82-2AD8-90C7-4CC0-33BCA4D39AFB}"/>
+                </a:ext>
+              </a:extLst>
+            </p:cNvPr>
+            <p:cNvCxnSpPr>
+              <a:cxnSpLocks/>
+              <a:stCxn id="71" idx="2"/>
+              <a:endCxn id="77" idx="1"/>
+            </p:cNvCxnSpPr>
+            <p:nvPr/>
+          </p:nvCxnSpPr>
+          <p:spPr>
+            <a:xfrm rot="16200000" flipH="1">
+              <a:off x="9546497" y="3018970"/>
+              <a:ext cx="1302740" cy="79348"/>
+            </a:xfrm>
+            <a:prstGeom prst="bentConnector2">
+              <a:avLst/>
+            </a:prstGeom>
+          </p:spPr>
+          <p:style>
+            <a:lnRef idx="1">
+              <a:schemeClr val="accent1"/>
+            </a:lnRef>
+            <a:fillRef idx="0">
+              <a:schemeClr val="accent1"/>
+            </a:fillRef>
+            <a:effectRef idx="0">
+              <a:schemeClr val="accent1"/>
+            </a:effectRef>
+            <a:fontRef idx="minor">
+              <a:schemeClr val="tx1"/>
+            </a:fontRef>
+          </p:style>
+        </p:cxnSp>
+        <p:sp>
+          <p:nvSpPr>
+            <p:cNvPr id="107" name="Textfeld 106">
+              <a:extLst>
+                <a:ext uri="{FF2B5EF4-FFF2-40B4-BE49-F238E27FC236}">
+                  <a16:creationId xmlns:a16="http://schemas.microsoft.com/office/drawing/2014/main" id="{39ABD02B-8C26-6393-38A0-CF4D26834D9E}"/>
+                </a:ext>
+              </a:extLst>
+            </p:cNvPr>
+            <p:cNvSpPr txBox="1"/>
+            <p:nvPr/>
+          </p:nvSpPr>
+          <p:spPr>
+            <a:xfrm>
+              <a:off x="6319496" y="1500149"/>
+              <a:ext cx="1588897" cy="246221"/>
+            </a:xfrm>
+            <a:prstGeom prst="rect">
+              <a:avLst/>
+            </a:prstGeom>
+            <a:noFill/>
+            <a:ln>
+              <a:solidFill>
+                <a:schemeClr val="tx1"/>
+              </a:solidFill>
+            </a:ln>
+          </p:spPr>
+          <p:txBody>
+            <a:bodyPr wrap="none" rtlCol="0">
+              <a:spAutoFit/>
+            </a:bodyPr>
+            <a:lstStyle/>
+            <a:p>
+              <a:r>
+                <a:rPr lang="de-DE" sz="1000" dirty="0" err="1"/>
+                <a:t>FtSwarmPixel</a:t>
+              </a:r>
+              <a:r>
+                <a:rPr lang="de-DE" sz="1000" dirty="0"/>
+                <a:t> -&gt; </a:t>
+              </a:r>
+              <a:r>
+                <a:rPr lang="de-DE" sz="1000" dirty="0" err="1"/>
+                <a:t>SwOSPixel</a:t>
+              </a:r>
+              <a:endParaRPr lang="de-DE" sz="1000" dirty="0"/>
+            </a:p>
+          </p:txBody>
+        </p:sp>
+        <p:cxnSp>
+          <p:nvCxnSpPr>
+            <p:cNvPr id="109" name="Verbinder: gewinkelt 108">
+              <a:extLst>
+                <a:ext uri="{FF2B5EF4-FFF2-40B4-BE49-F238E27FC236}">
+                  <a16:creationId xmlns:a16="http://schemas.microsoft.com/office/drawing/2014/main" id="{FB1FEF8C-4085-FDD8-F42B-9F4C373E7062}"/>
+                </a:ext>
+              </a:extLst>
+            </p:cNvPr>
+            <p:cNvCxnSpPr>
+              <a:cxnSpLocks/>
+              <a:stCxn id="4" idx="2"/>
+              <a:endCxn id="107" idx="1"/>
+            </p:cNvCxnSpPr>
+            <p:nvPr/>
+          </p:nvCxnSpPr>
+          <p:spPr>
+            <a:xfrm rot="16200000" flipH="1">
+              <a:off x="5872601" y="1176365"/>
+              <a:ext cx="576408" cy="317381"/>
+            </a:xfrm>
+            <a:prstGeom prst="bentConnector2">
+              <a:avLst/>
+            </a:prstGeom>
+          </p:spPr>
+          <p:style>
+            <a:lnRef idx="1">
+              <a:schemeClr val="accent1"/>
+            </a:lnRef>
+            <a:fillRef idx="0">
+              <a:schemeClr val="accent1"/>
+            </a:fillRef>
+            <a:effectRef idx="0">
+              <a:schemeClr val="accent1"/>
+            </a:effectRef>
+            <a:fontRef idx="minor">
+              <a:schemeClr val="tx1"/>
+            </a:fontRef>
+          </p:style>
+        </p:cxnSp>
+        <p:sp>
+          <p:nvSpPr>
+            <p:cNvPr id="111" name="Textfeld 110">
+              <a:extLst>
+                <a:ext uri="{FF2B5EF4-FFF2-40B4-BE49-F238E27FC236}">
+                  <a16:creationId xmlns:a16="http://schemas.microsoft.com/office/drawing/2014/main" id="{5D06B0D2-426A-964F-860E-BF26F37F00B1}"/>
+                </a:ext>
+              </a:extLst>
+            </p:cNvPr>
+            <p:cNvSpPr txBox="1"/>
+            <p:nvPr/>
+          </p:nvSpPr>
+          <p:spPr>
+            <a:xfrm>
+              <a:off x="6319496" y="1887855"/>
+              <a:ext cx="1688283" cy="246221"/>
+            </a:xfrm>
+            <a:prstGeom prst="rect">
+              <a:avLst/>
+            </a:prstGeom>
+            <a:noFill/>
+            <a:ln>
+              <a:solidFill>
+                <a:schemeClr val="tx1"/>
+              </a:solidFill>
+            </a:ln>
+          </p:spPr>
+          <p:txBody>
+            <a:bodyPr wrap="none" rtlCol="0">
+              <a:spAutoFit/>
+            </a:bodyPr>
+            <a:lstStyle/>
+            <a:p>
+              <a:r>
+                <a:rPr lang="de-DE" sz="1000" dirty="0" err="1"/>
+                <a:t>FtSwarmServo</a:t>
+              </a:r>
+              <a:r>
+                <a:rPr lang="de-DE" sz="1000" dirty="0"/>
+                <a:t> -&gt; </a:t>
+              </a:r>
+              <a:r>
+                <a:rPr lang="de-DE" sz="1000" dirty="0" err="1"/>
+                <a:t>SwOSServo</a:t>
+              </a:r>
+              <a:endParaRPr lang="de-DE" sz="1000" dirty="0"/>
+            </a:p>
+          </p:txBody>
+        </p:sp>
+        <p:cxnSp>
+          <p:nvCxnSpPr>
+            <p:cNvPr id="113" name="Verbinder: gewinkelt 112">
+              <a:extLst>
+                <a:ext uri="{FF2B5EF4-FFF2-40B4-BE49-F238E27FC236}">
+                  <a16:creationId xmlns:a16="http://schemas.microsoft.com/office/drawing/2014/main" id="{ACC916C4-03B8-8E3F-7C10-FC27E154FB48}"/>
+                </a:ext>
+              </a:extLst>
+            </p:cNvPr>
+            <p:cNvCxnSpPr>
+              <a:cxnSpLocks/>
+              <a:stCxn id="4" idx="2"/>
+              <a:endCxn id="111" idx="1"/>
+            </p:cNvCxnSpPr>
+            <p:nvPr/>
+          </p:nvCxnSpPr>
+          <p:spPr>
+            <a:xfrm rot="16200000" flipH="1">
+              <a:off x="5678748" y="1370218"/>
+              <a:ext cx="964114" cy="317381"/>
+            </a:xfrm>
+            <a:prstGeom prst="bentConnector2">
+              <a:avLst/>
+            </a:prstGeom>
+          </p:spPr>
+          <p:style>
+            <a:lnRef idx="1">
+              <a:schemeClr val="accent1"/>
+            </a:lnRef>
+            <a:fillRef idx="0">
+              <a:schemeClr val="accent1"/>
+            </a:fillRef>
+            <a:effectRef idx="0">
+              <a:schemeClr val="accent1"/>
+            </a:effectRef>
+            <a:fontRef idx="minor">
+              <a:schemeClr val="tx1"/>
+            </a:fontRef>
+          </p:style>
+        </p:cxnSp>
+        <p:sp>
+          <p:nvSpPr>
+            <p:cNvPr id="115" name="Textfeld 114">
+              <a:extLst>
+                <a:ext uri="{FF2B5EF4-FFF2-40B4-BE49-F238E27FC236}">
+                  <a16:creationId xmlns:a16="http://schemas.microsoft.com/office/drawing/2014/main" id="{94115395-96A2-9749-CD13-E65C25ACD61F}"/>
+                </a:ext>
+              </a:extLst>
+            </p:cNvPr>
+            <p:cNvSpPr txBox="1"/>
+            <p:nvPr/>
+          </p:nvSpPr>
+          <p:spPr>
+            <a:xfrm>
+              <a:off x="6314529" y="2257184"/>
+              <a:ext cx="1604927" cy="246221"/>
+            </a:xfrm>
+            <a:prstGeom prst="rect">
+              <a:avLst/>
+            </a:prstGeom>
+            <a:noFill/>
+            <a:ln>
+              <a:solidFill>
+                <a:schemeClr val="tx1"/>
+              </a:solidFill>
+            </a:ln>
+          </p:spPr>
+          <p:txBody>
+            <a:bodyPr wrap="none" rtlCol="0">
+              <a:spAutoFit/>
+            </a:bodyPr>
+            <a:lstStyle/>
+            <a:p>
+              <a:r>
+                <a:rPr lang="de-DE" sz="1000" dirty="0" err="1"/>
+                <a:t>FtSwarmCAM</a:t>
+              </a:r>
+              <a:r>
+                <a:rPr lang="de-DE" sz="1000" dirty="0"/>
+                <a:t> -&gt; </a:t>
+              </a:r>
+              <a:r>
+                <a:rPr lang="de-DE" sz="1000" dirty="0" err="1"/>
+                <a:t>SwOSCAM</a:t>
+              </a:r>
+              <a:endParaRPr lang="de-DE" sz="1000" dirty="0"/>
+            </a:p>
+          </p:txBody>
+        </p:sp>
+        <p:cxnSp>
+          <p:nvCxnSpPr>
+            <p:cNvPr id="117" name="Verbinder: gewinkelt 116">
+              <a:extLst>
+                <a:ext uri="{FF2B5EF4-FFF2-40B4-BE49-F238E27FC236}">
+                  <a16:creationId xmlns:a16="http://schemas.microsoft.com/office/drawing/2014/main" id="{4051FA4A-0BCE-6CB6-5116-0F3E662170FC}"/>
+                </a:ext>
+              </a:extLst>
+            </p:cNvPr>
+            <p:cNvCxnSpPr>
+              <a:stCxn id="4" idx="2"/>
+              <a:endCxn id="115" idx="1"/>
+            </p:cNvCxnSpPr>
+            <p:nvPr/>
+          </p:nvCxnSpPr>
+          <p:spPr>
+            <a:xfrm rot="16200000" flipH="1">
+              <a:off x="5491601" y="1557366"/>
+              <a:ext cx="1333443" cy="312414"/>
+            </a:xfrm>
+            <a:prstGeom prst="bentConnector2">
+              <a:avLst/>
+            </a:prstGeom>
+          </p:spPr>
+          <p:style>
+            <a:lnRef idx="1">
+              <a:schemeClr val="accent1"/>
+            </a:lnRef>
+            <a:fillRef idx="0">
+              <a:schemeClr val="accent1"/>
+            </a:fillRef>
+            <a:effectRef idx="0">
+              <a:schemeClr val="accent1"/>
+            </a:effectRef>
+            <a:fontRef idx="minor">
+              <a:schemeClr val="tx1"/>
+            </a:fontRef>
+          </p:style>
+        </p:cxnSp>
+        <p:sp>
+          <p:nvSpPr>
+            <p:cNvPr id="118" name="Textfeld 117">
+              <a:extLst>
+                <a:ext uri="{FF2B5EF4-FFF2-40B4-BE49-F238E27FC236}">
+                  <a16:creationId xmlns:a16="http://schemas.microsoft.com/office/drawing/2014/main" id="{525FB795-FDC3-7693-1BB3-FB438CE9C7E2}"/>
+                </a:ext>
+              </a:extLst>
+            </p:cNvPr>
+            <p:cNvSpPr txBox="1"/>
+            <p:nvPr/>
+          </p:nvSpPr>
+          <p:spPr>
+            <a:xfrm>
+              <a:off x="6319496" y="2654974"/>
+              <a:ext cx="1903085" cy="246221"/>
+            </a:xfrm>
+            <a:prstGeom prst="rect">
+              <a:avLst/>
+            </a:prstGeom>
+            <a:noFill/>
+            <a:ln>
+              <a:solidFill>
+                <a:schemeClr val="tx1"/>
+              </a:solidFill>
+            </a:ln>
+          </p:spPr>
+          <p:txBody>
+            <a:bodyPr wrap="none" rtlCol="0">
+              <a:spAutoFit/>
+            </a:bodyPr>
+            <a:lstStyle/>
+            <a:p>
+              <a:r>
+                <a:rPr lang="de-DE" sz="1000" dirty="0" err="1"/>
+                <a:t>FtSwarmJoystick</a:t>
+              </a:r>
+              <a:r>
+                <a:rPr lang="de-DE" sz="1000" dirty="0"/>
+                <a:t> -&gt; </a:t>
+              </a:r>
+              <a:r>
+                <a:rPr lang="de-DE" sz="1000" dirty="0" err="1"/>
+                <a:t>SwOSJoystick</a:t>
+              </a:r>
+              <a:endParaRPr lang="de-DE" sz="1000" dirty="0"/>
+            </a:p>
+          </p:txBody>
+        </p:sp>
+        <p:sp>
+          <p:nvSpPr>
+            <p:cNvPr id="119" name="Textfeld 118">
+              <a:extLst>
+                <a:ext uri="{FF2B5EF4-FFF2-40B4-BE49-F238E27FC236}">
+                  <a16:creationId xmlns:a16="http://schemas.microsoft.com/office/drawing/2014/main" id="{2E9100AC-CEE2-05C7-18AE-4CCCDC592501}"/>
+                </a:ext>
+              </a:extLst>
+            </p:cNvPr>
+            <p:cNvSpPr txBox="1"/>
+            <p:nvPr/>
+          </p:nvSpPr>
+          <p:spPr>
+            <a:xfrm>
+              <a:off x="6314529" y="3090369"/>
+              <a:ext cx="1435008" cy="246221"/>
+            </a:xfrm>
+            <a:prstGeom prst="rect">
+              <a:avLst/>
+            </a:prstGeom>
+            <a:noFill/>
+            <a:ln>
+              <a:solidFill>
+                <a:schemeClr val="tx1"/>
+              </a:solidFill>
+            </a:ln>
+          </p:spPr>
+          <p:txBody>
+            <a:bodyPr wrap="none" rtlCol="0">
+              <a:spAutoFit/>
+            </a:bodyPr>
+            <a:lstStyle/>
+            <a:p>
+              <a:r>
+                <a:rPr lang="de-DE" sz="1000" dirty="0"/>
+                <a:t>FtSwarmI2C -&gt; SwOSI2C</a:t>
+              </a:r>
+            </a:p>
+          </p:txBody>
+        </p:sp>
+        <p:sp>
+          <p:nvSpPr>
+            <p:cNvPr id="120" name="Textfeld 119">
+              <a:extLst>
+                <a:ext uri="{FF2B5EF4-FFF2-40B4-BE49-F238E27FC236}">
+                  <a16:creationId xmlns:a16="http://schemas.microsoft.com/office/drawing/2014/main" id="{1012D5B4-807F-BEB7-E021-6E3E25C3FB77}"/>
+                </a:ext>
+              </a:extLst>
+            </p:cNvPr>
+            <p:cNvSpPr txBox="1"/>
+            <p:nvPr/>
+          </p:nvSpPr>
+          <p:spPr>
+            <a:xfrm>
+              <a:off x="6314529" y="3525764"/>
+              <a:ext cx="1662635" cy="246221"/>
+            </a:xfrm>
+            <a:prstGeom prst="rect">
+              <a:avLst/>
+            </a:prstGeom>
+            <a:noFill/>
+            <a:ln>
+              <a:solidFill>
+                <a:schemeClr val="tx1"/>
+              </a:solidFill>
+            </a:ln>
+          </p:spPr>
+          <p:txBody>
+            <a:bodyPr wrap="none" rtlCol="0">
+              <a:spAutoFit/>
+            </a:bodyPr>
+            <a:lstStyle/>
+            <a:p>
+              <a:r>
+                <a:rPr lang="de-DE" sz="1000" dirty="0" err="1"/>
+                <a:t>FtSwarmOLED</a:t>
+              </a:r>
+              <a:r>
+                <a:rPr lang="de-DE" sz="1000" dirty="0"/>
+                <a:t> -&gt; </a:t>
+              </a:r>
+              <a:r>
+                <a:rPr lang="de-DE" sz="1000" dirty="0" err="1"/>
+                <a:t>SwOSOLED</a:t>
+              </a:r>
+              <a:endParaRPr lang="de-DE" sz="1000" dirty="0"/>
+            </a:p>
+          </p:txBody>
+        </p:sp>
+        <p:cxnSp>
+          <p:nvCxnSpPr>
+            <p:cNvPr id="122" name="Verbinder: gewinkelt 121">
+              <a:extLst>
+                <a:ext uri="{FF2B5EF4-FFF2-40B4-BE49-F238E27FC236}">
+                  <a16:creationId xmlns:a16="http://schemas.microsoft.com/office/drawing/2014/main" id="{2154E7EB-9B6D-F7E4-8D2A-A1E0EC5DCE59}"/>
+                </a:ext>
+              </a:extLst>
+            </p:cNvPr>
+            <p:cNvCxnSpPr>
+              <a:cxnSpLocks/>
+              <a:stCxn id="4" idx="2"/>
+              <a:endCxn id="118" idx="1"/>
+            </p:cNvCxnSpPr>
+            <p:nvPr/>
+          </p:nvCxnSpPr>
+          <p:spPr>
+            <a:xfrm rot="16200000" flipH="1">
+              <a:off x="5295189" y="1753777"/>
+              <a:ext cx="1731233" cy="317381"/>
+            </a:xfrm>
+            <a:prstGeom prst="bentConnector2">
+              <a:avLst/>
+            </a:prstGeom>
+          </p:spPr>
+          <p:style>
+            <a:lnRef idx="1">
+              <a:schemeClr val="accent1"/>
+            </a:lnRef>
+            <a:fillRef idx="0">
+              <a:schemeClr val="accent1"/>
+            </a:fillRef>
+            <a:effectRef idx="0">
+              <a:schemeClr val="accent1"/>
+            </a:effectRef>
+            <a:fontRef idx="minor">
+              <a:schemeClr val="tx1"/>
+            </a:fontRef>
+          </p:style>
+        </p:cxnSp>
+        <p:cxnSp>
+          <p:nvCxnSpPr>
+            <p:cNvPr id="125" name="Verbinder: gewinkelt 124">
+              <a:extLst>
+                <a:ext uri="{FF2B5EF4-FFF2-40B4-BE49-F238E27FC236}">
+                  <a16:creationId xmlns:a16="http://schemas.microsoft.com/office/drawing/2014/main" id="{EF93FB31-187C-BE70-BC20-CEF4BFEDD572}"/>
+                </a:ext>
+              </a:extLst>
+            </p:cNvPr>
+            <p:cNvCxnSpPr>
+              <a:cxnSpLocks/>
+              <a:stCxn id="4" idx="2"/>
+              <a:endCxn id="119" idx="1"/>
+            </p:cNvCxnSpPr>
+            <p:nvPr/>
+          </p:nvCxnSpPr>
+          <p:spPr>
+            <a:xfrm rot="16200000" flipH="1">
+              <a:off x="5075008" y="1973959"/>
+              <a:ext cx="2166628" cy="312414"/>
+            </a:xfrm>
+            <a:prstGeom prst="bentConnector2">
+              <a:avLst/>
+            </a:prstGeom>
+          </p:spPr>
+          <p:style>
+            <a:lnRef idx="1">
+              <a:schemeClr val="accent1"/>
+            </a:lnRef>
+            <a:fillRef idx="0">
+              <a:schemeClr val="accent1"/>
+            </a:fillRef>
+            <a:effectRef idx="0">
+              <a:schemeClr val="accent1"/>
+            </a:effectRef>
+            <a:fontRef idx="minor">
+              <a:schemeClr val="tx1"/>
+            </a:fontRef>
+          </p:style>
+        </p:cxnSp>
+        <p:cxnSp>
+          <p:nvCxnSpPr>
+            <p:cNvPr id="128" name="Verbinder: gewinkelt 127">
+              <a:extLst>
+                <a:ext uri="{FF2B5EF4-FFF2-40B4-BE49-F238E27FC236}">
+                  <a16:creationId xmlns:a16="http://schemas.microsoft.com/office/drawing/2014/main" id="{21B7B44C-F5BD-35D4-820A-F41BC20F42DE}"/>
+                </a:ext>
+              </a:extLst>
+            </p:cNvPr>
+            <p:cNvCxnSpPr>
+              <a:stCxn id="4" idx="2"/>
+              <a:endCxn id="120" idx="1"/>
+            </p:cNvCxnSpPr>
+            <p:nvPr/>
+          </p:nvCxnSpPr>
+          <p:spPr>
+            <a:xfrm rot="16200000" flipH="1">
+              <a:off x="4857311" y="2191656"/>
+              <a:ext cx="2602023" cy="312414"/>
+            </a:xfrm>
+            <a:prstGeom prst="bentConnector2">
+              <a:avLst/>
+            </a:prstGeom>
+          </p:spPr>
+          <p:style>
+            <a:lnRef idx="1">
+              <a:schemeClr val="accent1"/>
+            </a:lnRef>
+            <a:fillRef idx="0">
+              <a:schemeClr val="accent1"/>
+            </a:fillRef>
+            <a:effectRef idx="0">
+              <a:schemeClr val="accent1"/>
+            </a:effectRef>
+            <a:fontRef idx="minor">
+              <a:schemeClr val="tx1"/>
+            </a:fontRef>
+          </p:style>
+        </p:cxnSp>
+        <p:sp>
+          <p:nvSpPr>
+            <p:cNvPr id="3" name="Textfeld 2">
+              <a:extLst>
+                <a:ext uri="{FF2B5EF4-FFF2-40B4-BE49-F238E27FC236}">
+                  <a16:creationId xmlns:a16="http://schemas.microsoft.com/office/drawing/2014/main" id="{09827B89-6134-281E-A4FE-ACD95FD30547}"/>
+                </a:ext>
+              </a:extLst>
+            </p:cNvPr>
+            <p:cNvSpPr txBox="1"/>
+            <p:nvPr/>
+          </p:nvSpPr>
+          <p:spPr>
+            <a:xfrm>
+              <a:off x="10287310" y="5428138"/>
+              <a:ext cx="1335622" cy="215444"/>
+            </a:xfrm>
+            <a:prstGeom prst="rect">
+              <a:avLst/>
+            </a:prstGeom>
+            <a:noFill/>
+            <a:ln>
+              <a:solidFill>
+                <a:schemeClr val="tx1"/>
+              </a:solidFill>
+            </a:ln>
+          </p:spPr>
+          <p:txBody>
+            <a:bodyPr wrap="none" rtlCol="0">
+              <a:spAutoFit/>
+            </a:bodyPr>
+            <a:lstStyle/>
+            <a:p>
+              <a:pPr algn="ctr"/>
+              <a:r>
+                <a:rPr lang="de-DE" sz="800" dirty="0" err="1">
+                  <a:solidFill>
+                    <a:srgbClr val="FF0000"/>
+                  </a:solidFill>
+                </a:rPr>
+                <a:t>Red</a:t>
+              </a:r>
+              <a:r>
+                <a:rPr lang="de-DE" sz="800" dirty="0">
+                  <a:solidFill>
+                    <a:srgbClr val="FF0000"/>
+                  </a:solidFill>
+                </a:rPr>
+                <a:t>: Helper </a:t>
+              </a:r>
+              <a:r>
+                <a:rPr lang="de-DE" sz="800" dirty="0" err="1">
+                  <a:solidFill>
+                    <a:srgbClr val="FF0000"/>
+                  </a:solidFill>
+                </a:rPr>
+                <a:t>class</a:t>
+              </a:r>
+              <a:r>
+                <a:rPr lang="de-DE" sz="800" dirty="0">
+                  <a:solidFill>
+                    <a:srgbClr val="FF0000"/>
+                  </a:solidFill>
+                </a:rPr>
+                <a:t>, </a:t>
+              </a:r>
+              <a:r>
+                <a:rPr lang="de-DE" sz="800" dirty="0" err="1">
+                  <a:solidFill>
+                    <a:srgbClr val="FF0000"/>
+                  </a:solidFill>
+                </a:rPr>
+                <a:t>don‘t</a:t>
+              </a:r>
+              <a:r>
+                <a:rPr lang="de-DE" sz="800" dirty="0">
+                  <a:solidFill>
+                    <a:srgbClr val="FF0000"/>
+                  </a:solidFill>
+                </a:rPr>
+                <a:t> </a:t>
+              </a:r>
+              <a:r>
+                <a:rPr lang="de-DE" sz="800" dirty="0" err="1">
+                  <a:solidFill>
+                    <a:srgbClr val="FF0000"/>
+                  </a:solidFill>
+                </a:rPr>
+                <a:t>use</a:t>
+              </a:r>
+              <a:endParaRPr lang="de-DE" sz="800" dirty="0">
+                <a:solidFill>
+                  <a:srgbClr val="FF0000"/>
+                </a:solidFill>
+              </a:endParaRPr>
+            </a:p>
+          </p:txBody>
+        </p:sp>
+        <p:sp>
+          <p:nvSpPr>
+            <p:cNvPr id="6" name="Textfeld 5">
+              <a:extLst>
+                <a:ext uri="{FF2B5EF4-FFF2-40B4-BE49-F238E27FC236}">
+                  <a16:creationId xmlns:a16="http://schemas.microsoft.com/office/drawing/2014/main" id="{E5533B1B-B78C-2CB1-F85D-809292A34E6E}"/>
+                </a:ext>
+              </a:extLst>
+            </p:cNvPr>
+            <p:cNvSpPr txBox="1"/>
+            <p:nvPr/>
+          </p:nvSpPr>
+          <p:spPr>
+            <a:xfrm>
+              <a:off x="10287310" y="5717550"/>
+              <a:ext cx="1335622" cy="215444"/>
+            </a:xfrm>
+            <a:prstGeom prst="rect">
+              <a:avLst/>
+            </a:prstGeom>
+            <a:noFill/>
+            <a:ln>
+              <a:solidFill>
+                <a:schemeClr val="tx1"/>
+              </a:solidFill>
+            </a:ln>
+          </p:spPr>
+          <p:txBody>
+            <a:bodyPr wrap="square" rtlCol="0">
+              <a:spAutoFit/>
+            </a:bodyPr>
+            <a:lstStyle/>
+            <a:p>
+              <a:pPr algn="ctr"/>
+              <a:r>
+                <a:rPr lang="de-DE" sz="800" dirty="0"/>
+                <a:t>User </a:t>
+              </a:r>
+              <a:r>
+                <a:rPr lang="de-DE" sz="800" dirty="0" err="1"/>
+                <a:t>classes</a:t>
+              </a:r>
+              <a:endParaRPr lang="de-DE" sz="800" dirty="0"/>
+            </a:p>
+          </p:txBody>
+        </p:sp>
+      </p:grpSp>
+    </p:spTree>
+    <p:extLst>
+      <p:ext uri="{BB962C8B-B14F-4D97-AF65-F5344CB8AC3E}">
+        <p14:creationId xmlns:p14="http://schemas.microsoft.com/office/powerpoint/2010/main" val="4022065700"/>
       </p:ext>
     </p:extLst>
   </p:cSld>

</xml_diff>